<commit_message>
Slides updated with the topic: iotschema4Node-RED over npm
</commit_message>
<xml_diff>
--- a/iotschema-20200220.pptx
+++ b/iotschema-20200220.pptx
@@ -5,7 +5,7 @@
     <p:sldMasterId id="2147483660" r:id="rId1"/>
   </p:sldMasterIdLst>
   <p:notesMasterIdLst>
-    <p:notesMasterId r:id="rId14"/>
+    <p:notesMasterId r:id="rId18"/>
   </p:notesMasterIdLst>
   <p:sldIdLst>
     <p:sldId id="256" r:id="rId2"/>
@@ -16,10 +16,14 @@
     <p:sldId id="278" r:id="rId7"/>
     <p:sldId id="280" r:id="rId8"/>
     <p:sldId id="284" r:id="rId9"/>
-    <p:sldId id="286" r:id="rId10"/>
-    <p:sldId id="287" r:id="rId11"/>
-    <p:sldId id="288" r:id="rId12"/>
-    <p:sldId id="285" r:id="rId13"/>
+    <p:sldId id="290" r:id="rId10"/>
+    <p:sldId id="257" r:id="rId11"/>
+    <p:sldId id="258" r:id="rId12"/>
+    <p:sldId id="259" r:id="rId13"/>
+    <p:sldId id="286" r:id="rId14"/>
+    <p:sldId id="287" r:id="rId15"/>
+    <p:sldId id="288" r:id="rId16"/>
+    <p:sldId id="285" r:id="rId17"/>
   </p:sldIdLst>
   <p:sldSz cx="9144000" cy="6858000" type="letter"/>
   <p:notesSz cx="6858000" cy="9144000"/>
@@ -208,7 +212,7 @@
           <a:p>
             <a:fld id="{5FCBBBB3-5D7B-284E-801E-D00035F0C91A}" type="datetimeFigureOut">
               <a:rPr lang="en-US" smtClean="0"/>
-              <a:t>2/19/20</a:t>
+              <a:t>2/20/2020</a:t>
             </a:fld>
             <a:endParaRPr lang="en-US"/>
           </a:p>
@@ -272,38 +276,37 @@
           <a:p>
             <a:pPr lvl="0"/>
             <a:r>
-              <a:rPr lang="en-US" smtClean="0"/>
+              <a:rPr lang="en-US"/>
               <a:t>Click to edit Master text styles</a:t>
             </a:r>
           </a:p>
           <a:p>
             <a:pPr lvl="1"/>
             <a:r>
-              <a:rPr lang="en-US" smtClean="0"/>
+              <a:rPr lang="en-US"/>
               <a:t>Second level</a:t>
             </a:r>
           </a:p>
           <a:p>
             <a:pPr lvl="2"/>
             <a:r>
-              <a:rPr lang="en-US" smtClean="0"/>
+              <a:rPr lang="en-US"/>
               <a:t>Third level</a:t>
             </a:r>
           </a:p>
           <a:p>
             <a:pPr lvl="3"/>
             <a:r>
-              <a:rPr lang="en-US" smtClean="0"/>
+              <a:rPr lang="en-US"/>
               <a:t>Fourth level</a:t>
             </a:r>
           </a:p>
           <a:p>
             <a:pPr lvl="4"/>
             <a:r>
-              <a:rPr lang="en-US" smtClean="0"/>
+              <a:rPr lang="en-US"/>
               <a:t>Fifth level</a:t>
             </a:r>
-            <a:endParaRPr lang="en-US"/>
           </a:p>
         </p:txBody>
       </p:sp>
@@ -520,6 +523,90 @@
           <a:bodyPr/>
           <a:lstStyle/>
           <a:p>
+            <a:endParaRPr lang="en-US"/>
+          </a:p>
+        </p:txBody>
+      </p:sp>
+      <p:sp>
+        <p:nvSpPr>
+          <p:cNvPr id="4" name="Slide Number Placeholder 3"/>
+          <p:cNvSpPr>
+            <a:spLocks noGrp="1"/>
+          </p:cNvSpPr>
+          <p:nvPr>
+            <p:ph type="sldNum" sz="quarter" idx="10"/>
+          </p:nvPr>
+        </p:nvSpPr>
+        <p:spPr/>
+        <p:txBody>
+          <a:bodyPr/>
+          <a:lstStyle/>
+          <a:p>
+            <a:fld id="{0CC4FBCF-C3C7-B24B-9323-9B8C8BD54741}" type="slidenum">
+              <a:rPr lang="en-US" smtClean="0"/>
+              <a:t>9</a:t>
+            </a:fld>
+            <a:endParaRPr lang="en-US"/>
+          </a:p>
+        </p:txBody>
+      </p:sp>
+    </p:spTree>
+    <p:extLst>
+      <p:ext uri="{BB962C8B-B14F-4D97-AF65-F5344CB8AC3E}">
+        <p14:creationId xmlns:p14="http://schemas.microsoft.com/office/powerpoint/2010/main" val="2695709579"/>
+      </p:ext>
+    </p:extLst>
+  </p:cSld>
+  <p:clrMapOvr>
+    <a:masterClrMapping/>
+  </p:clrMapOvr>
+</p:notes>
+</file>
+
+<file path=ppt/notesSlides/notesSlide2.xml><?xml version="1.0" encoding="utf-8"?>
+<p:notes xmlns:a="http://schemas.openxmlformats.org/drawingml/2006/main" xmlns:r="http://schemas.openxmlformats.org/officeDocument/2006/relationships" xmlns:p="http://schemas.openxmlformats.org/presentationml/2006/main">
+  <p:cSld>
+    <p:spTree>
+      <p:nvGrpSpPr>
+        <p:cNvPr id="1" name=""/>
+        <p:cNvGrpSpPr/>
+        <p:nvPr/>
+      </p:nvGrpSpPr>
+      <p:grpSpPr>
+        <a:xfrm>
+          <a:off x="0" y="0"/>
+          <a:ext cx="0" cy="0"/>
+          <a:chOff x="0" y="0"/>
+          <a:chExt cx="0" cy="0"/>
+        </a:xfrm>
+      </p:grpSpPr>
+      <p:sp>
+        <p:nvSpPr>
+          <p:cNvPr id="2" name="Slide Image Placeholder 1"/>
+          <p:cNvSpPr>
+            <a:spLocks noGrp="1" noRot="1" noChangeAspect="1"/>
+          </p:cNvSpPr>
+          <p:nvPr>
+            <p:ph type="sldImg"/>
+          </p:nvPr>
+        </p:nvSpPr>
+        <p:spPr/>
+      </p:sp>
+      <p:sp>
+        <p:nvSpPr>
+          <p:cNvPr id="3" name="Notes Placeholder 2"/>
+          <p:cNvSpPr>
+            <a:spLocks noGrp="1"/>
+          </p:cNvSpPr>
+          <p:nvPr>
+            <p:ph type="body" idx="1"/>
+          </p:nvPr>
+        </p:nvSpPr>
+        <p:spPr/>
+        <p:txBody>
+          <a:bodyPr/>
+          <a:lstStyle/>
+          <a:p>
             <a:endParaRPr lang="de-DE"/>
           </a:p>
         </p:txBody>
@@ -541,7 +628,7 @@
           <a:p>
             <a:fld id="{908A13AE-56B5-4D33-933E-747D896FF9D2}" type="slidenum">
               <a:rPr lang="de-DE" smtClean="0"/>
-              <a:t>9</a:t>
+              <a:t>13</a:t>
             </a:fld>
             <a:endParaRPr lang="de-DE"/>
           </a:p>
@@ -602,7 +689,7 @@
           </a:lstStyle>
           <a:p>
             <a:r>
-              <a:rPr lang="en-US" smtClean="0"/>
+              <a:rPr lang="en-US"/>
               <a:t>Click to edit Master title style</a:t>
             </a:r>
             <a:endParaRPr lang="en-US" dirty="0"/>
@@ -667,7 +754,7 @@
           </a:lstStyle>
           <a:p>
             <a:r>
-              <a:rPr lang="en-US" smtClean="0"/>
+              <a:rPr lang="en-US"/>
               <a:t>Click to edit Master subtitle style</a:t>
             </a:r>
             <a:endParaRPr lang="en-US" dirty="0"/>
@@ -691,7 +778,7 @@
           <a:p>
             <a:fld id="{F774572E-0D61-7C4C-A97B-03BC6FC8585C}" type="datetimeFigureOut">
               <a:rPr lang="en-US" smtClean="0"/>
-              <a:t>2/19/20</a:t>
+              <a:t>2/20/2020</a:t>
             </a:fld>
             <a:endParaRPr lang="en-US"/>
           </a:p>
@@ -780,7 +867,7 @@
           <a:lstStyle/>
           <a:p>
             <a:r>
-              <a:rPr lang="en-US" smtClean="0"/>
+              <a:rPr lang="en-US"/>
               <a:t>Click to edit Master title style</a:t>
             </a:r>
             <a:endParaRPr lang="en-US" dirty="0"/>
@@ -804,35 +891,35 @@
           <a:p>
             <a:pPr lvl="0"/>
             <a:r>
-              <a:rPr lang="en-US" smtClean="0"/>
+              <a:rPr lang="en-US"/>
               <a:t>Click to edit Master text styles</a:t>
             </a:r>
           </a:p>
           <a:p>
             <a:pPr lvl="1"/>
             <a:r>
-              <a:rPr lang="en-US" smtClean="0"/>
+              <a:rPr lang="en-US"/>
               <a:t>Second level</a:t>
             </a:r>
           </a:p>
           <a:p>
             <a:pPr lvl="2"/>
             <a:r>
-              <a:rPr lang="en-US" smtClean="0"/>
+              <a:rPr lang="en-US"/>
               <a:t>Third level</a:t>
             </a:r>
           </a:p>
           <a:p>
             <a:pPr lvl="3"/>
             <a:r>
-              <a:rPr lang="en-US" smtClean="0"/>
+              <a:rPr lang="en-US"/>
               <a:t>Fourth level</a:t>
             </a:r>
           </a:p>
           <a:p>
             <a:pPr lvl="4"/>
             <a:r>
-              <a:rPr lang="en-US" smtClean="0"/>
+              <a:rPr lang="en-US"/>
               <a:t>Fifth level</a:t>
             </a:r>
             <a:endParaRPr lang="en-US" dirty="0"/>
@@ -856,7 +943,7 @@
           <a:p>
             <a:fld id="{F774572E-0D61-7C4C-A97B-03BC6FC8585C}" type="datetimeFigureOut">
               <a:rPr lang="en-US" smtClean="0"/>
-              <a:t>2/19/20</a:t>
+              <a:t>2/20/2020</a:t>
             </a:fld>
             <a:endParaRPr lang="en-US"/>
           </a:p>
@@ -950,7 +1037,7 @@
           <a:lstStyle/>
           <a:p>
             <a:r>
-              <a:rPr lang="en-US" smtClean="0"/>
+              <a:rPr lang="en-US"/>
               <a:t>Click to edit Master title style</a:t>
             </a:r>
             <a:endParaRPr lang="en-US" dirty="0"/>
@@ -979,35 +1066,35 @@
           <a:p>
             <a:pPr lvl="0"/>
             <a:r>
-              <a:rPr lang="en-US" smtClean="0"/>
+              <a:rPr lang="en-US"/>
               <a:t>Click to edit Master text styles</a:t>
             </a:r>
           </a:p>
           <a:p>
             <a:pPr lvl="1"/>
             <a:r>
-              <a:rPr lang="en-US" smtClean="0"/>
+              <a:rPr lang="en-US"/>
               <a:t>Second level</a:t>
             </a:r>
           </a:p>
           <a:p>
             <a:pPr lvl="2"/>
             <a:r>
-              <a:rPr lang="en-US" smtClean="0"/>
+              <a:rPr lang="en-US"/>
               <a:t>Third level</a:t>
             </a:r>
           </a:p>
           <a:p>
             <a:pPr lvl="3"/>
             <a:r>
-              <a:rPr lang="en-US" smtClean="0"/>
+              <a:rPr lang="en-US"/>
               <a:t>Fourth level</a:t>
             </a:r>
           </a:p>
           <a:p>
             <a:pPr lvl="4"/>
             <a:r>
-              <a:rPr lang="en-US" smtClean="0"/>
+              <a:rPr lang="en-US"/>
               <a:t>Fifth level</a:t>
             </a:r>
             <a:endParaRPr lang="en-US" dirty="0"/>
@@ -1031,7 +1118,7 @@
           <a:p>
             <a:fld id="{F774572E-0D61-7C4C-A97B-03BC6FC8585C}" type="datetimeFigureOut">
               <a:rPr lang="en-US" smtClean="0"/>
-              <a:t>2/19/20</a:t>
+              <a:t>2/20/2020</a:t>
             </a:fld>
             <a:endParaRPr lang="en-US"/>
           </a:p>
@@ -1120,7 +1207,7 @@
           <a:lstStyle/>
           <a:p>
             <a:r>
-              <a:rPr lang="en-US" smtClean="0"/>
+              <a:rPr lang="en-US"/>
               <a:t>Click to edit Master title style</a:t>
             </a:r>
             <a:endParaRPr lang="en-US" dirty="0"/>
@@ -1144,35 +1231,35 @@
           <a:p>
             <a:pPr lvl="0"/>
             <a:r>
-              <a:rPr lang="en-US" smtClean="0"/>
+              <a:rPr lang="en-US"/>
               <a:t>Click to edit Master text styles</a:t>
             </a:r>
           </a:p>
           <a:p>
             <a:pPr lvl="1"/>
             <a:r>
-              <a:rPr lang="en-US" smtClean="0"/>
+              <a:rPr lang="en-US"/>
               <a:t>Second level</a:t>
             </a:r>
           </a:p>
           <a:p>
             <a:pPr lvl="2"/>
             <a:r>
-              <a:rPr lang="en-US" smtClean="0"/>
+              <a:rPr lang="en-US"/>
               <a:t>Third level</a:t>
             </a:r>
           </a:p>
           <a:p>
             <a:pPr lvl="3"/>
             <a:r>
-              <a:rPr lang="en-US" smtClean="0"/>
+              <a:rPr lang="en-US"/>
               <a:t>Fourth level</a:t>
             </a:r>
           </a:p>
           <a:p>
             <a:pPr lvl="4"/>
             <a:r>
-              <a:rPr lang="en-US" smtClean="0"/>
+              <a:rPr lang="en-US"/>
               <a:t>Fifth level</a:t>
             </a:r>
             <a:endParaRPr lang="en-US" dirty="0"/>
@@ -1196,7 +1283,7 @@
           <a:p>
             <a:fld id="{F774572E-0D61-7C4C-A97B-03BC6FC8585C}" type="datetimeFigureOut">
               <a:rPr lang="en-US" smtClean="0"/>
-              <a:t>2/19/20</a:t>
+              <a:t>2/20/2020</a:t>
             </a:fld>
             <a:endParaRPr lang="en-US"/>
           </a:p>
@@ -1294,7 +1381,7 @@
           </a:lstStyle>
           <a:p>
             <a:r>
-              <a:rPr lang="en-US" smtClean="0"/>
+              <a:rPr lang="en-US"/>
               <a:t>Click to edit Master title style</a:t>
             </a:r>
             <a:endParaRPr lang="en-US" dirty="0"/>
@@ -1412,7 +1499,7 @@
           <a:p>
             <a:pPr lvl="0"/>
             <a:r>
-              <a:rPr lang="en-US" smtClean="0"/>
+              <a:rPr lang="en-US"/>
               <a:t>Click to edit Master text styles</a:t>
             </a:r>
           </a:p>
@@ -1435,7 +1522,7 @@
           <a:p>
             <a:fld id="{F774572E-0D61-7C4C-A97B-03BC6FC8585C}" type="datetimeFigureOut">
               <a:rPr lang="en-US" smtClean="0"/>
-              <a:t>2/19/20</a:t>
+              <a:t>2/20/2020</a:t>
             </a:fld>
             <a:endParaRPr lang="en-US"/>
           </a:p>
@@ -1524,7 +1611,7 @@
           <a:lstStyle/>
           <a:p>
             <a:r>
-              <a:rPr lang="en-US" smtClean="0"/>
+              <a:rPr lang="en-US"/>
               <a:t>Click to edit Master title style</a:t>
             </a:r>
             <a:endParaRPr lang="en-US" dirty="0"/>
@@ -1553,35 +1640,35 @@
           <a:p>
             <a:pPr lvl="0"/>
             <a:r>
-              <a:rPr lang="en-US" smtClean="0"/>
+              <a:rPr lang="en-US"/>
               <a:t>Click to edit Master text styles</a:t>
             </a:r>
           </a:p>
           <a:p>
             <a:pPr lvl="1"/>
             <a:r>
-              <a:rPr lang="en-US" smtClean="0"/>
+              <a:rPr lang="en-US"/>
               <a:t>Second level</a:t>
             </a:r>
           </a:p>
           <a:p>
             <a:pPr lvl="2"/>
             <a:r>
-              <a:rPr lang="en-US" smtClean="0"/>
+              <a:rPr lang="en-US"/>
               <a:t>Third level</a:t>
             </a:r>
           </a:p>
           <a:p>
             <a:pPr lvl="3"/>
             <a:r>
-              <a:rPr lang="en-US" smtClean="0"/>
+              <a:rPr lang="en-US"/>
               <a:t>Fourth level</a:t>
             </a:r>
           </a:p>
           <a:p>
             <a:pPr lvl="4"/>
             <a:r>
-              <a:rPr lang="en-US" smtClean="0"/>
+              <a:rPr lang="en-US"/>
               <a:t>Fifth level</a:t>
             </a:r>
             <a:endParaRPr lang="en-US" dirty="0"/>
@@ -1610,35 +1697,35 @@
           <a:p>
             <a:pPr lvl="0"/>
             <a:r>
-              <a:rPr lang="en-US" smtClean="0"/>
+              <a:rPr lang="en-US"/>
               <a:t>Click to edit Master text styles</a:t>
             </a:r>
           </a:p>
           <a:p>
             <a:pPr lvl="1"/>
             <a:r>
-              <a:rPr lang="en-US" smtClean="0"/>
+              <a:rPr lang="en-US"/>
               <a:t>Second level</a:t>
             </a:r>
           </a:p>
           <a:p>
             <a:pPr lvl="2"/>
             <a:r>
-              <a:rPr lang="en-US" smtClean="0"/>
+              <a:rPr lang="en-US"/>
               <a:t>Third level</a:t>
             </a:r>
           </a:p>
           <a:p>
             <a:pPr lvl="3"/>
             <a:r>
-              <a:rPr lang="en-US" smtClean="0"/>
+              <a:rPr lang="en-US"/>
               <a:t>Fourth level</a:t>
             </a:r>
           </a:p>
           <a:p>
             <a:pPr lvl="4"/>
             <a:r>
-              <a:rPr lang="en-US" smtClean="0"/>
+              <a:rPr lang="en-US"/>
               <a:t>Fifth level</a:t>
             </a:r>
             <a:endParaRPr lang="en-US" dirty="0"/>
@@ -1662,7 +1749,7 @@
           <a:p>
             <a:fld id="{F774572E-0D61-7C4C-A97B-03BC6FC8585C}" type="datetimeFigureOut">
               <a:rPr lang="en-US" smtClean="0"/>
-              <a:t>2/19/20</a:t>
+              <a:t>2/20/2020</a:t>
             </a:fld>
             <a:endParaRPr lang="en-US"/>
           </a:p>
@@ -1756,7 +1843,7 @@
           <a:lstStyle/>
           <a:p>
             <a:r>
-              <a:rPr lang="en-US" smtClean="0"/>
+              <a:rPr lang="en-US"/>
               <a:t>Click to edit Master title style</a:t>
             </a:r>
             <a:endParaRPr lang="en-US" dirty="0"/>
@@ -1822,7 +1909,7 @@
           <a:p>
             <a:pPr lvl="0"/>
             <a:r>
-              <a:rPr lang="en-US" smtClean="0"/>
+              <a:rPr lang="en-US"/>
               <a:t>Click to edit Master text styles</a:t>
             </a:r>
           </a:p>
@@ -1850,35 +1937,35 @@
           <a:p>
             <a:pPr lvl="0"/>
             <a:r>
-              <a:rPr lang="en-US" smtClean="0"/>
+              <a:rPr lang="en-US"/>
               <a:t>Click to edit Master text styles</a:t>
             </a:r>
           </a:p>
           <a:p>
             <a:pPr lvl="1"/>
             <a:r>
-              <a:rPr lang="en-US" smtClean="0"/>
+              <a:rPr lang="en-US"/>
               <a:t>Second level</a:t>
             </a:r>
           </a:p>
           <a:p>
             <a:pPr lvl="2"/>
             <a:r>
-              <a:rPr lang="en-US" smtClean="0"/>
+              <a:rPr lang="en-US"/>
               <a:t>Third level</a:t>
             </a:r>
           </a:p>
           <a:p>
             <a:pPr lvl="3"/>
             <a:r>
-              <a:rPr lang="en-US" smtClean="0"/>
+              <a:rPr lang="en-US"/>
               <a:t>Fourth level</a:t>
             </a:r>
           </a:p>
           <a:p>
             <a:pPr lvl="4"/>
             <a:r>
-              <a:rPr lang="en-US" smtClean="0"/>
+              <a:rPr lang="en-US"/>
               <a:t>Fifth level</a:t>
             </a:r>
             <a:endParaRPr lang="en-US" dirty="0"/>
@@ -1944,7 +2031,7 @@
           <a:p>
             <a:pPr lvl="0"/>
             <a:r>
-              <a:rPr lang="en-US" smtClean="0"/>
+              <a:rPr lang="en-US"/>
               <a:t>Click to edit Master text styles</a:t>
             </a:r>
           </a:p>
@@ -1972,35 +2059,35 @@
           <a:p>
             <a:pPr lvl="0"/>
             <a:r>
-              <a:rPr lang="en-US" smtClean="0"/>
+              <a:rPr lang="en-US"/>
               <a:t>Click to edit Master text styles</a:t>
             </a:r>
           </a:p>
           <a:p>
             <a:pPr lvl="1"/>
             <a:r>
-              <a:rPr lang="en-US" smtClean="0"/>
+              <a:rPr lang="en-US"/>
               <a:t>Second level</a:t>
             </a:r>
           </a:p>
           <a:p>
             <a:pPr lvl="2"/>
             <a:r>
-              <a:rPr lang="en-US" smtClean="0"/>
+              <a:rPr lang="en-US"/>
               <a:t>Third level</a:t>
             </a:r>
           </a:p>
           <a:p>
             <a:pPr lvl="3"/>
             <a:r>
-              <a:rPr lang="en-US" smtClean="0"/>
+              <a:rPr lang="en-US"/>
               <a:t>Fourth level</a:t>
             </a:r>
           </a:p>
           <a:p>
             <a:pPr lvl="4"/>
             <a:r>
-              <a:rPr lang="en-US" smtClean="0"/>
+              <a:rPr lang="en-US"/>
               <a:t>Fifth level</a:t>
             </a:r>
             <a:endParaRPr lang="en-US" dirty="0"/>
@@ -2024,7 +2111,7 @@
           <a:p>
             <a:fld id="{F774572E-0D61-7C4C-A97B-03BC6FC8585C}" type="datetimeFigureOut">
               <a:rPr lang="en-US" smtClean="0"/>
-              <a:t>2/19/20</a:t>
+              <a:t>2/20/2020</a:t>
             </a:fld>
             <a:endParaRPr lang="en-US"/>
           </a:p>
@@ -2113,7 +2200,7 @@
           <a:lstStyle/>
           <a:p>
             <a:r>
-              <a:rPr lang="en-US" smtClean="0"/>
+              <a:rPr lang="en-US"/>
               <a:t>Click to edit Master title style</a:t>
             </a:r>
             <a:endParaRPr lang="en-US" dirty="0"/>
@@ -2137,7 +2224,7 @@
           <a:p>
             <a:fld id="{F774572E-0D61-7C4C-A97B-03BC6FC8585C}" type="datetimeFigureOut">
               <a:rPr lang="en-US" smtClean="0"/>
-              <a:t>2/19/20</a:t>
+              <a:t>2/20/2020</a:t>
             </a:fld>
             <a:endParaRPr lang="en-US"/>
           </a:p>
@@ -2227,7 +2314,7 @@
           <a:p>
             <a:fld id="{F774572E-0D61-7C4C-A97B-03BC6FC8585C}" type="datetimeFigureOut">
               <a:rPr lang="en-US" smtClean="0"/>
-              <a:t>2/19/20</a:t>
+              <a:t>2/20/2020</a:t>
             </a:fld>
             <a:endParaRPr lang="en-US"/>
           </a:p>
@@ -2325,7 +2412,7 @@
           </a:lstStyle>
           <a:p>
             <a:r>
-              <a:rPr lang="en-US" smtClean="0"/>
+              <a:rPr lang="en-US"/>
               <a:t>Click to edit Master title style</a:t>
             </a:r>
             <a:endParaRPr lang="en-US" dirty="0"/>
@@ -2382,35 +2469,35 @@
           <a:p>
             <a:pPr lvl="0"/>
             <a:r>
-              <a:rPr lang="en-US" smtClean="0"/>
+              <a:rPr lang="en-US"/>
               <a:t>Click to edit Master text styles</a:t>
             </a:r>
           </a:p>
           <a:p>
             <a:pPr lvl="1"/>
             <a:r>
-              <a:rPr lang="en-US" smtClean="0"/>
+              <a:rPr lang="en-US"/>
               <a:t>Second level</a:t>
             </a:r>
           </a:p>
           <a:p>
             <a:pPr lvl="2"/>
             <a:r>
-              <a:rPr lang="en-US" smtClean="0"/>
+              <a:rPr lang="en-US"/>
               <a:t>Third level</a:t>
             </a:r>
           </a:p>
           <a:p>
             <a:pPr lvl="3"/>
             <a:r>
-              <a:rPr lang="en-US" smtClean="0"/>
+              <a:rPr lang="en-US"/>
               <a:t>Fourth level</a:t>
             </a:r>
           </a:p>
           <a:p>
             <a:pPr lvl="4"/>
             <a:r>
-              <a:rPr lang="en-US" smtClean="0"/>
+              <a:rPr lang="en-US"/>
               <a:t>Fifth level</a:t>
             </a:r>
             <a:endParaRPr lang="en-US" dirty="0"/>
@@ -2476,7 +2563,7 @@
           <a:p>
             <a:pPr lvl="0"/>
             <a:r>
-              <a:rPr lang="en-US" smtClean="0"/>
+              <a:rPr lang="en-US"/>
               <a:t>Click to edit Master text styles</a:t>
             </a:r>
           </a:p>
@@ -2499,7 +2586,7 @@
           <a:p>
             <a:fld id="{F774572E-0D61-7C4C-A97B-03BC6FC8585C}" type="datetimeFigureOut">
               <a:rPr lang="en-US" smtClean="0"/>
-              <a:t>2/19/20</a:t>
+              <a:t>2/20/2020</a:t>
             </a:fld>
             <a:endParaRPr lang="en-US"/>
           </a:p>
@@ -2597,7 +2684,7 @@
           </a:lstStyle>
           <a:p>
             <a:r>
-              <a:rPr lang="en-US" smtClean="0"/>
+              <a:rPr lang="en-US"/>
               <a:t>Click to edit Master title style</a:t>
             </a:r>
             <a:endParaRPr lang="en-US" dirty="0"/>
@@ -2662,7 +2749,7 @@
           </a:lstStyle>
           <a:p>
             <a:r>
-              <a:rPr lang="en-US" smtClean="0"/>
+              <a:rPr lang="en-US"/>
               <a:t>Drag picture to placeholder or click icon to add</a:t>
             </a:r>
             <a:endParaRPr lang="en-US" dirty="0"/>
@@ -2728,7 +2815,7 @@
           <a:p>
             <a:pPr lvl="0"/>
             <a:r>
-              <a:rPr lang="en-US" smtClean="0"/>
+              <a:rPr lang="en-US"/>
               <a:t>Click to edit Master text styles</a:t>
             </a:r>
           </a:p>
@@ -2751,7 +2838,7 @@
           <a:p>
             <a:fld id="{F774572E-0D61-7C4C-A97B-03BC6FC8585C}" type="datetimeFigureOut">
               <a:rPr lang="en-US" smtClean="0"/>
-              <a:t>2/19/20</a:t>
+              <a:t>2/20/2020</a:t>
             </a:fld>
             <a:endParaRPr lang="en-US"/>
           </a:p>
@@ -2855,7 +2942,7 @@
           <a:lstStyle/>
           <a:p>
             <a:r>
-              <a:rPr lang="en-US" smtClean="0"/>
+              <a:rPr lang="en-US"/>
               <a:t>Click to edit Master title style</a:t>
             </a:r>
             <a:endParaRPr lang="en-US" dirty="0"/>
@@ -2889,35 +2976,35 @@
           <a:p>
             <a:pPr lvl="0"/>
             <a:r>
-              <a:rPr lang="en-US" smtClean="0"/>
+              <a:rPr lang="en-US"/>
               <a:t>Click to edit Master text styles</a:t>
             </a:r>
           </a:p>
           <a:p>
             <a:pPr lvl="1"/>
             <a:r>
-              <a:rPr lang="en-US" smtClean="0"/>
+              <a:rPr lang="en-US"/>
               <a:t>Second level</a:t>
             </a:r>
           </a:p>
           <a:p>
             <a:pPr lvl="2"/>
             <a:r>
-              <a:rPr lang="en-US" smtClean="0"/>
+              <a:rPr lang="en-US"/>
               <a:t>Third level</a:t>
             </a:r>
           </a:p>
           <a:p>
             <a:pPr lvl="3"/>
             <a:r>
-              <a:rPr lang="en-US" smtClean="0"/>
+              <a:rPr lang="en-US"/>
               <a:t>Fourth level</a:t>
             </a:r>
           </a:p>
           <a:p>
             <a:pPr lvl="4"/>
             <a:r>
-              <a:rPr lang="en-US" smtClean="0"/>
+              <a:rPr lang="en-US"/>
               <a:t>Fifth level</a:t>
             </a:r>
             <a:endParaRPr lang="en-US" dirty="0"/>
@@ -2959,7 +3046,7 @@
           <a:p>
             <a:fld id="{F774572E-0D61-7C4C-A97B-03BC6FC8585C}" type="datetimeFigureOut">
               <a:rPr lang="en-US" smtClean="0"/>
-              <a:t>2/19/20</a:t>
+              <a:t>2/20/2020</a:t>
             </a:fld>
             <a:endParaRPr lang="en-US"/>
           </a:p>
@@ -3380,22 +3467,21 @@
           <a:lstStyle/>
           <a:p>
             <a:r>
-              <a:rPr lang="en-US" dirty="0" err="1" smtClean="0"/>
+              <a:rPr lang="en-US" dirty="0" err="1"/>
               <a:t>IoT</a:t>
             </a:r>
             <a:r>
-              <a:rPr lang="en-US" dirty="0" smtClean="0"/>
+              <a:rPr lang="en-US" dirty="0"/>
               <a:t> Extensions for </a:t>
             </a:r>
             <a:r>
-              <a:rPr lang="en-US" dirty="0" err="1" smtClean="0"/>
+              <a:rPr lang="en-US" dirty="0" err="1"/>
               <a:t>schema.org</a:t>
             </a:r>
             <a:r>
-              <a:rPr lang="en-US" dirty="0" smtClean="0"/>
+              <a:rPr lang="en-US" dirty="0"/>
               <a:t> </a:t>
             </a:r>
-            <a:endParaRPr lang="en-US" dirty="0"/>
           </a:p>
         </p:txBody>
       </p:sp>
@@ -3415,13 +3501,13 @@
           <a:lstStyle/>
           <a:p>
             <a:r>
-              <a:rPr lang="en-US" dirty="0" smtClean="0"/>
+              <a:rPr lang="en-US" dirty="0"/>
               <a:t>Community Teleconference</a:t>
             </a:r>
           </a:p>
           <a:p>
             <a:r>
-              <a:rPr lang="en-US" dirty="0" smtClean="0"/>
+              <a:rPr lang="en-US" dirty="0"/>
               <a:t>January 20, 2020</a:t>
             </a:r>
           </a:p>
@@ -3437,13 +3523,6 @@
   <p:clrMapOvr>
     <a:masterClrMapping/>
   </p:clrMapOvr>
-  <p:timing>
-    <p:tnLst>
-      <p:par>
-        <p:cTn id="1" dur="indefinite" restart="never" nodeType="tmRoot"/>
-      </p:par>
-    </p:tnLst>
-  </p:timing>
 </p:sld>
 </file>
 
@@ -3466,7 +3545,13 @@
       </p:grpSpPr>
       <p:sp>
         <p:nvSpPr>
-          <p:cNvPr id="2" name="Title 1"/>
+          <p:cNvPr id="2" name="Title 1">
+            <a:extLst>
+              <a:ext uri="{FF2B5EF4-FFF2-40B4-BE49-F238E27FC236}">
+                <a16:creationId xmlns:a16="http://schemas.microsoft.com/office/drawing/2014/main" id="{9A489092-BC57-4C14-8534-8DBFC9C5E189}"/>
+              </a:ext>
+            </a:extLst>
+          </p:cNvPr>
           <p:cNvSpPr>
             <a:spLocks noGrp="1"/>
           </p:cNvSpPr>
@@ -3480,12 +3565,20 @@
           <a:lstStyle/>
           <a:p>
             <a:r>
-              <a:rPr lang="en-US" dirty="0" err="1" smtClean="0"/>
-              <a:t>Schema.org</a:t>
-            </a:r>
-            <a:r>
-              <a:rPr lang="en-US" dirty="0" smtClean="0"/>
-              <a:t> Integration</a:t>
+              <a:rPr lang="en-US" dirty="0"/>
+              <a:t>Publishing </a:t>
+            </a:r>
+            <a:r>
+              <a:rPr lang="en-US" dirty="0" err="1"/>
+              <a:t>iotschema</a:t>
+            </a:r>
+            <a:r>
+              <a:rPr lang="en-US" dirty="0"/>
+              <a:t> Nodes to </a:t>
+            </a:r>
+            <a:r>
+              <a:rPr lang="en-US" dirty="0" err="1"/>
+              <a:t>npm</a:t>
             </a:r>
             <a:endParaRPr lang="en-US" dirty="0"/>
           </a:p>
@@ -3493,7 +3586,13 @@
       </p:sp>
       <p:sp>
         <p:nvSpPr>
-          <p:cNvPr id="3" name="Content Placeholder 2"/>
+          <p:cNvPr id="3" name="Content Placeholder 2">
+            <a:extLst>
+              <a:ext uri="{FF2B5EF4-FFF2-40B4-BE49-F238E27FC236}">
+                <a16:creationId xmlns:a16="http://schemas.microsoft.com/office/drawing/2014/main" id="{2B137D1E-7747-4046-9AD9-8E46C377A96A}"/>
+              </a:ext>
+            </a:extLst>
+          </p:cNvPr>
           <p:cNvSpPr>
             <a:spLocks noGrp="1"/>
           </p:cNvSpPr>
@@ -3507,107 +3606,69 @@
           <a:lstStyle/>
           <a:p>
             <a:r>
-              <a:rPr lang="en-US" dirty="0" smtClean="0"/>
-              <a:t>The </a:t>
-            </a:r>
-            <a:r>
-              <a:rPr lang="en-US" dirty="0" err="1" smtClean="0"/>
-              <a:t>WoT</a:t>
-            </a:r>
-            <a:r>
-              <a:rPr lang="en-US" dirty="0" smtClean="0"/>
-              <a:t> use case is based on annotation consisting of RDF @type statements that point to URIs of defined terms for specialized types that conform to the classes in the meta-model</a:t>
-            </a:r>
-          </a:p>
-          <a:p>
-            <a:r>
-              <a:rPr lang="en-US" dirty="0" smtClean="0"/>
-              <a:t>These meta-model classes would only add about 6 new property types to </a:t>
-            </a:r>
-            <a:r>
-              <a:rPr lang="en-US" dirty="0" err="1" smtClean="0"/>
-              <a:t>schema.org</a:t>
-            </a:r>
-            <a:endParaRPr lang="en-US" dirty="0" smtClean="0"/>
+              <a:rPr lang="en-US" dirty="0" err="1"/>
+              <a:t>iotschema</a:t>
+            </a:r>
+            <a:r>
+              <a:rPr lang="en-US" dirty="0"/>
+              <a:t> nodes are currently being adapted for publication on the </a:t>
+            </a:r>
+            <a:r>
+              <a:rPr lang="en-US" dirty="0" err="1"/>
+              <a:t>npm</a:t>
+            </a:r>
+            <a:r>
+              <a:rPr lang="en-US" dirty="0"/>
+              <a:t> repository</a:t>
+            </a:r>
+          </a:p>
+          <a:p>
+            <a:r>
+              <a:rPr lang="en-US" dirty="0"/>
+              <a:t>This will allow </a:t>
+            </a:r>
+            <a:r>
+              <a:rPr lang="en-US" dirty="0" err="1"/>
+              <a:t>iotschema</a:t>
+            </a:r>
+            <a:r>
+              <a:rPr lang="en-US" dirty="0"/>
+              <a:t> Node-RED developers to easily find and access nodes without having to go via the GitHub route.</a:t>
+            </a:r>
+          </a:p>
+          <a:p>
+            <a:r>
+              <a:rPr lang="en-US" dirty="0"/>
+              <a:t>Currently available:</a:t>
+            </a:r>
           </a:p>
           <a:p>
             <a:pPr lvl="1"/>
             <a:r>
-              <a:rPr lang="en-US" dirty="0" err="1" smtClean="0"/>
-              <a:t>iotCapability</a:t>
-            </a:r>
-            <a:r>
-              <a:rPr lang="en-US" dirty="0" smtClean="0"/>
-              <a:t>, </a:t>
-            </a:r>
-            <a:r>
-              <a:rPr lang="en-US" dirty="0" err="1" smtClean="0"/>
-              <a:t>iotEvent</a:t>
-            </a:r>
-            <a:r>
-              <a:rPr lang="en-US" dirty="0" smtClean="0"/>
-              <a:t>, </a:t>
-            </a:r>
-            <a:r>
-              <a:rPr lang="en-US" dirty="0" err="1" smtClean="0"/>
-              <a:t>iotAction</a:t>
-            </a:r>
-            <a:r>
-              <a:rPr lang="en-US" dirty="0" smtClean="0"/>
-              <a:t>, </a:t>
-            </a:r>
-            <a:r>
-              <a:rPr lang="en-US" dirty="0" err="1" smtClean="0"/>
-              <a:t>iotProperty</a:t>
-            </a:r>
-            <a:r>
-              <a:rPr lang="en-US" dirty="0" smtClean="0"/>
-              <a:t>, </a:t>
-            </a:r>
-            <a:r>
-              <a:rPr lang="en-US" dirty="0" err="1" smtClean="0"/>
-              <a:t>iotData</a:t>
-            </a:r>
-            <a:r>
-              <a:rPr lang="en-US" dirty="0" smtClean="0"/>
-              <a:t>, </a:t>
-            </a:r>
-            <a:r>
-              <a:rPr lang="en-US" dirty="0" err="1" smtClean="0"/>
-              <a:t>iotFeatureofInterest</a:t>
-            </a:r>
-            <a:endParaRPr lang="en-US" dirty="0" smtClean="0"/>
+              <a:rPr lang="en-US" dirty="0"/>
+              <a:t>17 packages</a:t>
+            </a:r>
           </a:p>
           <a:p>
             <a:pPr lvl="1"/>
             <a:r>
-              <a:rPr lang="en-US" dirty="0" smtClean="0"/>
-              <a:t>new types like </a:t>
-            </a:r>
-            <a:r>
-              <a:rPr lang="en-US" dirty="0" err="1" smtClean="0"/>
-              <a:t>iotInterface</a:t>
-            </a:r>
-            <a:r>
-              <a:rPr lang="en-US" dirty="0" smtClean="0"/>
-              <a:t>, </a:t>
-            </a:r>
-            <a:r>
-              <a:rPr lang="en-US" dirty="0" err="1" smtClean="0"/>
-              <a:t>iotThing</a:t>
-            </a:r>
-            <a:r>
-              <a:rPr lang="en-US" dirty="0" smtClean="0"/>
-              <a:t>, etc. as needed</a:t>
-            </a:r>
-            <a:endParaRPr lang="en-US" dirty="0"/>
+              <a:rPr lang="en-US" dirty="0"/>
+              <a:t>Migration for packages A-C completed</a:t>
+            </a:r>
+          </a:p>
+          <a:p>
+            <a:pPr lvl="1"/>
+            <a:r>
+              <a:rPr lang="en-US" dirty="0"/>
+              <a:t>D-W in progress</a:t>
+            </a:r>
           </a:p>
         </p:txBody>
       </p:sp>
     </p:spTree>
     <p:extLst>
       <p:ext uri="{BB962C8B-B14F-4D97-AF65-F5344CB8AC3E}">
-        <p14:creationId xmlns:p14="http://schemas.microsoft.com/office/powerpoint/2010/main" val="192793757"/>
+        <p14:creationId xmlns:p14="http://schemas.microsoft.com/office/powerpoint/2010/main" val="3110342027"/>
       </p:ext>
     </p:extLst>
   </p:cSld>
@@ -3636,7 +3697,13 @@
       </p:grpSpPr>
       <p:sp>
         <p:nvSpPr>
-          <p:cNvPr id="2" name="Title 1"/>
+          <p:cNvPr id="2" name="Title 1">
+            <a:extLst>
+              <a:ext uri="{FF2B5EF4-FFF2-40B4-BE49-F238E27FC236}">
+                <a16:creationId xmlns:a16="http://schemas.microsoft.com/office/drawing/2014/main" id="{89B0A7AB-DA27-4CC3-88B2-5927CA4D023E}"/>
+              </a:ext>
+            </a:extLst>
+          </p:cNvPr>
           <p:cNvSpPr>
             <a:spLocks noGrp="1"/>
           </p:cNvSpPr>
@@ -3644,170 +3711,212 @@
             <p:ph type="title"/>
           </p:nvPr>
         </p:nvSpPr>
+        <p:spPr/>
+        <p:txBody>
+          <a:bodyPr/>
+          <a:lstStyle/>
+          <a:p>
+            <a:r>
+              <a:rPr lang="en-US" dirty="0"/>
+              <a:t>How to use </a:t>
+            </a:r>
+            <a:r>
+              <a:rPr lang="en-US" dirty="0" err="1"/>
+              <a:t>npm</a:t>
+            </a:r>
+            <a:r>
+              <a:rPr lang="en-US" dirty="0"/>
+              <a:t> with </a:t>
+            </a:r>
+            <a:r>
+              <a:rPr lang="en-US" dirty="0" err="1"/>
+              <a:t>iotschema</a:t>
+            </a:r>
+            <a:r>
+              <a:rPr lang="en-US" dirty="0"/>
+              <a:t> nodes</a:t>
+            </a:r>
+          </a:p>
+        </p:txBody>
+      </p:sp>
+      <p:sp>
+        <p:nvSpPr>
+          <p:cNvPr id="3" name="Content Placeholder 2">
+            <a:extLst>
+              <a:ext uri="{FF2B5EF4-FFF2-40B4-BE49-F238E27FC236}">
+                <a16:creationId xmlns:a16="http://schemas.microsoft.com/office/drawing/2014/main" id="{08EA7300-79B9-4A21-864F-14E54C880B16}"/>
+              </a:ext>
+            </a:extLst>
+          </p:cNvPr>
+          <p:cNvSpPr>
+            <a:spLocks noGrp="1"/>
+          </p:cNvSpPr>
+          <p:nvPr>
+            <p:ph idx="1"/>
+          </p:nvPr>
+        </p:nvSpPr>
+        <p:spPr/>
+        <p:txBody>
+          <a:bodyPr/>
+          <a:lstStyle/>
+          <a:p>
+            <a:r>
+              <a:rPr lang="en-US" dirty="0"/>
+              <a:t>Users can simply issue the `</a:t>
+            </a:r>
+            <a:r>
+              <a:rPr lang="en-US" sz="1500" dirty="0" err="1">
+                <a:latin typeface="Lucida Console" panose="020B0609040504020204" pitchFamily="49" charset="0"/>
+              </a:rPr>
+              <a:t>npm</a:t>
+            </a:r>
+            <a:r>
+              <a:rPr lang="en-US" sz="1500" dirty="0">
+                <a:latin typeface="Lucida Console" panose="020B0609040504020204" pitchFamily="49" charset="0"/>
+              </a:rPr>
+              <a:t> install</a:t>
+            </a:r>
+            <a:r>
+              <a:rPr lang="en-US" dirty="0"/>
+              <a:t>` command from their Node-RED environment</a:t>
+            </a:r>
+          </a:p>
+          <a:p>
+            <a:pPr lvl="1"/>
+            <a:r>
+              <a:rPr lang="en-US" dirty="0"/>
+              <a:t>Example: </a:t>
+            </a:r>
+            <a:r>
+              <a:rPr lang="en-US" sz="1350" b="1" dirty="0" err="1">
+                <a:latin typeface="Lucida Console" panose="020B0609040504020204" pitchFamily="49" charset="0"/>
+              </a:rPr>
+              <a:t>npm</a:t>
+            </a:r>
+            <a:r>
+              <a:rPr lang="en-US" sz="1350" b="1" dirty="0">
+                <a:latin typeface="Lucida Console" panose="020B0609040504020204" pitchFamily="49" charset="0"/>
+              </a:rPr>
+              <a:t> install @</a:t>
+            </a:r>
+            <a:r>
+              <a:rPr lang="en-US" sz="1350" b="1" dirty="0" err="1">
+                <a:latin typeface="Lucida Console" panose="020B0609040504020204" pitchFamily="49" charset="0"/>
+              </a:rPr>
+              <a:t>iotschema</a:t>
+            </a:r>
+            <a:r>
+              <a:rPr lang="en-US" sz="1350" b="1" dirty="0">
+                <a:latin typeface="Lucida Console" panose="020B0609040504020204" pitchFamily="49" charset="0"/>
+              </a:rPr>
+              <a:t>/</a:t>
+            </a:r>
+            <a:r>
+              <a:rPr lang="en-US" sz="1350" b="1" dirty="0" err="1">
+                <a:latin typeface="Lucida Console" panose="020B0609040504020204" pitchFamily="49" charset="0"/>
+              </a:rPr>
+              <a:t>binaryswitch</a:t>
+            </a:r>
+            <a:endParaRPr lang="en-US" sz="1350" b="1" dirty="0">
+              <a:latin typeface="Lucida Console" panose="020B0609040504020204" pitchFamily="49" charset="0"/>
+            </a:endParaRPr>
+          </a:p>
+          <a:p>
+            <a:r>
+              <a:rPr lang="en-US" sz="1800" dirty="0"/>
+              <a:t>Nodes are hosted on the </a:t>
+            </a:r>
+            <a:r>
+              <a:rPr lang="en-US" sz="1800" dirty="0" err="1"/>
+              <a:t>npm</a:t>
+            </a:r>
+            <a:r>
+              <a:rPr lang="en-US" sz="1800" dirty="0"/>
+              <a:t> </a:t>
+            </a:r>
+            <a:r>
+              <a:rPr lang="en-US" sz="1800" dirty="0" err="1"/>
+              <a:t>reporitory</a:t>
+            </a:r>
+            <a:r>
+              <a:rPr lang="en-US" sz="1800" dirty="0"/>
+              <a:t> and are browsable on npmjs.com</a:t>
+            </a:r>
+          </a:p>
+          <a:p>
+            <a:endParaRPr lang="en-US" sz="1800" dirty="0"/>
+          </a:p>
+        </p:txBody>
+      </p:sp>
+      <p:pic>
+        <p:nvPicPr>
+          <p:cNvPr id="4" name="Picture 3">
+            <a:extLst>
+              <a:ext uri="{FF2B5EF4-FFF2-40B4-BE49-F238E27FC236}">
+                <a16:creationId xmlns:a16="http://schemas.microsoft.com/office/drawing/2014/main" id="{1188F709-458F-40E7-999B-93889D0E1B22}"/>
+              </a:ext>
+            </a:extLst>
+          </p:cNvPr>
+          <p:cNvPicPr>
+            <a:picLocks noChangeAspect="1"/>
+          </p:cNvPicPr>
+          <p:nvPr/>
+        </p:nvPicPr>
+        <p:blipFill>
+          <a:blip r:embed="rId2">
+            <a:extLst>
+              <a:ext uri="{28A0092B-C50C-407E-A947-70E740481C1C}">
+                <a14:useLocalDpi xmlns:a14="http://schemas.microsoft.com/office/drawing/2010/main" val="0"/>
+              </a:ext>
+            </a:extLst>
+          </a:blip>
+          <a:srcRect/>
+          <a:stretch/>
+        </p:blipFill>
         <p:spPr>
           <a:xfrm>
-            <a:off x="628650" y="126135"/>
-            <a:ext cx="7886700" cy="1325563"/>
+            <a:off x="880211" y="4450249"/>
+            <a:ext cx="4698187" cy="1503579"/>
           </a:xfrm>
+          <a:prstGeom prst="rect">
+            <a:avLst/>
+          </a:prstGeom>
         </p:spPr>
-        <p:txBody>
-          <a:bodyPr/>
-          <a:lstStyle/>
-          <a:p>
-            <a:r>
-              <a:rPr lang="en-US" dirty="0" err="1" smtClean="0"/>
-              <a:t>Schema.org</a:t>
-            </a:r>
-            <a:r>
-              <a:rPr lang="en-US" dirty="0" smtClean="0"/>
-              <a:t> Integration</a:t>
-            </a:r>
-            <a:endParaRPr lang="en-US" dirty="0"/>
-          </a:p>
-        </p:txBody>
-      </p:sp>
-      <p:sp>
-        <p:nvSpPr>
-          <p:cNvPr id="3" name="Content Placeholder 2"/>
-          <p:cNvSpPr>
-            <a:spLocks noGrp="1"/>
-          </p:cNvSpPr>
-          <p:nvPr>
-            <p:ph idx="1"/>
-          </p:nvPr>
-        </p:nvSpPr>
+      </p:pic>
+      <p:pic>
+        <p:nvPicPr>
+          <p:cNvPr id="5" name="Picture 4">
+            <a:extLst>
+              <a:ext uri="{FF2B5EF4-FFF2-40B4-BE49-F238E27FC236}">
+                <a16:creationId xmlns:a16="http://schemas.microsoft.com/office/drawing/2014/main" id="{D4B9BA00-AF52-41B6-98E7-6603AD97EFE1}"/>
+              </a:ext>
+            </a:extLst>
+          </p:cNvPr>
+          <p:cNvPicPr>
+            <a:picLocks noChangeAspect="1"/>
+          </p:cNvPicPr>
+          <p:nvPr/>
+        </p:nvPicPr>
+        <p:blipFill>
+          <a:blip r:embed="rId3"/>
+          <a:stretch>
+            <a:fillRect/>
+          </a:stretch>
+        </p:blipFill>
         <p:spPr>
           <a:xfrm>
-            <a:off x="628650" y="1451697"/>
-            <a:ext cx="7985414" cy="4637375"/>
+            <a:off x="796615" y="3513343"/>
+            <a:ext cx="6437738" cy="883374"/>
           </a:xfrm>
+          <a:prstGeom prst="rect">
+            <a:avLst/>
+          </a:prstGeom>
         </p:spPr>
-        <p:txBody>
-          <a:bodyPr/>
-          <a:lstStyle/>
-          <a:p>
-            <a:r>
-              <a:rPr lang="en-US" dirty="0" smtClean="0"/>
-              <a:t>There is a potential example pattern in </a:t>
-            </a:r>
-            <a:r>
-              <a:rPr lang="en-US" dirty="0" err="1" smtClean="0"/>
-              <a:t>schema.org</a:t>
-            </a:r>
-            <a:endParaRPr lang="en-US" dirty="0" smtClean="0"/>
-          </a:p>
-          <a:p>
-            <a:pPr lvl="1"/>
-            <a:r>
-              <a:rPr lang="en-US" dirty="0" err="1" smtClean="0"/>
-              <a:t>MedicalEntity</a:t>
-            </a:r>
-            <a:r>
-              <a:rPr lang="en-US" dirty="0" smtClean="0"/>
-              <a:t>, with about 7 property types</a:t>
-            </a:r>
-          </a:p>
-          <a:p>
-            <a:r>
-              <a:rPr lang="en-US" dirty="0" smtClean="0"/>
-              <a:t>Likewise, an instance of </a:t>
-            </a:r>
-            <a:r>
-              <a:rPr lang="en-US" dirty="0" err="1" smtClean="0"/>
-              <a:t>IoT</a:t>
-            </a:r>
-            <a:r>
-              <a:rPr lang="en-US" dirty="0" smtClean="0"/>
-              <a:t> Schema would contain some set of </a:t>
-            </a:r>
-            <a:r>
-              <a:rPr lang="en-US" dirty="0" err="1" smtClean="0"/>
-              <a:t>iotCapability</a:t>
-            </a:r>
-            <a:r>
-              <a:rPr lang="en-US" dirty="0" smtClean="0"/>
-              <a:t>, </a:t>
-            </a:r>
-            <a:r>
-              <a:rPr lang="en-US" dirty="0" err="1" smtClean="0"/>
-              <a:t>iotAction</a:t>
-            </a:r>
-            <a:r>
-              <a:rPr lang="en-US" dirty="0" smtClean="0"/>
-              <a:t>, </a:t>
-            </a:r>
-            <a:r>
-              <a:rPr lang="en-US" dirty="0" err="1" smtClean="0"/>
-              <a:t>iotProperty</a:t>
-            </a:r>
-            <a:r>
-              <a:rPr lang="en-US" dirty="0" smtClean="0"/>
-              <a:t>, </a:t>
-            </a:r>
-            <a:r>
-              <a:rPr lang="en-US" dirty="0" err="1" smtClean="0"/>
-              <a:t>iotEvent</a:t>
-            </a:r>
-            <a:r>
-              <a:rPr lang="en-US" dirty="0" smtClean="0"/>
-              <a:t>, </a:t>
-            </a:r>
-            <a:r>
-              <a:rPr lang="en-US" dirty="0" err="1" smtClean="0"/>
-              <a:t>iotFeatureOfInterest</a:t>
-            </a:r>
-            <a:r>
-              <a:rPr lang="en-US" dirty="0" smtClean="0"/>
-              <a:t> properties</a:t>
-            </a:r>
-          </a:p>
-          <a:p>
-            <a:r>
-              <a:rPr lang="en-US" dirty="0"/>
-              <a:t>Specialization of </a:t>
-            </a:r>
-            <a:r>
-              <a:rPr lang="en-US" dirty="0" err="1"/>
-              <a:t>iot</a:t>
-            </a:r>
-            <a:r>
-              <a:rPr lang="en-US" dirty="0"/>
-              <a:t> types would happen at the next level in the </a:t>
-            </a:r>
-            <a:r>
-              <a:rPr lang="en-US" dirty="0" smtClean="0"/>
-              <a:t>graph </a:t>
-            </a:r>
-            <a:r>
-              <a:rPr lang="mr-IN" dirty="0" smtClean="0"/>
-              <a:t>–</a:t>
-            </a:r>
-            <a:r>
-              <a:rPr lang="en-US" dirty="0" smtClean="0"/>
-              <a:t> hosted in a separate namespace </a:t>
-            </a:r>
-          </a:p>
-          <a:p>
-            <a:pPr lvl="1"/>
-            <a:r>
-              <a:rPr lang="en-US" dirty="0" smtClean="0"/>
-              <a:t>URIs that point to accepted specialized definitions in one or more specialized namespaces</a:t>
-            </a:r>
-          </a:p>
-          <a:p>
-            <a:pPr lvl="1"/>
-            <a:r>
-              <a:rPr lang="en-US" dirty="0" smtClean="0"/>
-              <a:t>lighting controls, thermostats, etc. that conform to the base types but have their own properties </a:t>
-            </a:r>
-            <a:endParaRPr lang="en-US" dirty="0"/>
-          </a:p>
-        </p:txBody>
-      </p:sp>
+      </p:pic>
     </p:spTree>
     <p:extLst>
       <p:ext uri="{BB962C8B-B14F-4D97-AF65-F5344CB8AC3E}">
-        <p14:creationId xmlns:p14="http://schemas.microsoft.com/office/powerpoint/2010/main" val="1879334223"/>
+        <p14:creationId xmlns:p14="http://schemas.microsoft.com/office/powerpoint/2010/main" val="1652002093"/>
       </p:ext>
     </p:extLst>
   </p:cSld>
@@ -3836,6 +3945,246 @@
       </p:grpSpPr>
       <p:sp>
         <p:nvSpPr>
+          <p:cNvPr id="2" name="Title 1">
+            <a:extLst>
+              <a:ext uri="{FF2B5EF4-FFF2-40B4-BE49-F238E27FC236}">
+                <a16:creationId xmlns:a16="http://schemas.microsoft.com/office/drawing/2014/main" id="{16504304-DEE7-4705-AA3E-D70E51192DD3}"/>
+              </a:ext>
+            </a:extLst>
+          </p:cNvPr>
+          <p:cNvSpPr>
+            <a:spLocks noGrp="1"/>
+          </p:cNvSpPr>
+          <p:nvPr>
+            <p:ph type="title"/>
+          </p:nvPr>
+        </p:nvSpPr>
+        <p:spPr/>
+        <p:txBody>
+          <a:bodyPr>
+            <a:normAutofit/>
+          </a:bodyPr>
+          <a:lstStyle/>
+          <a:p>
+            <a:r>
+              <a:rPr lang="en-US" sz="2700" dirty="0"/>
+              <a:t>Publishing </a:t>
+            </a:r>
+            <a:r>
+              <a:rPr lang="en-US" sz="2700" dirty="0" err="1"/>
+              <a:t>iotschema</a:t>
+            </a:r>
+            <a:r>
+              <a:rPr lang="en-US" sz="2700" dirty="0"/>
+              <a:t> Nodes to </a:t>
+            </a:r>
+            <a:r>
+              <a:rPr lang="en-US" sz="2700" dirty="0" err="1"/>
+              <a:t>npm</a:t>
+            </a:r>
+            <a:r>
+              <a:rPr lang="en-US" sz="2700" dirty="0"/>
+              <a:t> – Grouping</a:t>
+            </a:r>
+          </a:p>
+        </p:txBody>
+      </p:sp>
+      <p:sp>
+        <p:nvSpPr>
+          <p:cNvPr id="3" name="Content Placeholder 2">
+            <a:extLst>
+              <a:ext uri="{FF2B5EF4-FFF2-40B4-BE49-F238E27FC236}">
+                <a16:creationId xmlns:a16="http://schemas.microsoft.com/office/drawing/2014/main" id="{0A39DB3B-B34D-45FF-AD3E-687879574E4D}"/>
+              </a:ext>
+            </a:extLst>
+          </p:cNvPr>
+          <p:cNvSpPr>
+            <a:spLocks noGrp="1"/>
+          </p:cNvSpPr>
+          <p:nvPr>
+            <p:ph idx="1"/>
+          </p:nvPr>
+        </p:nvSpPr>
+        <p:spPr/>
+        <p:txBody>
+          <a:bodyPr/>
+          <a:lstStyle/>
+          <a:p>
+            <a:r>
+              <a:rPr lang="en-US" dirty="0"/>
+              <a:t>One umbrella module (</a:t>
+            </a:r>
+            <a:r>
+              <a:rPr lang="en-US" dirty="0" err="1"/>
+              <a:t>iotschema</a:t>
+            </a:r>
+            <a:r>
+              <a:rPr lang="en-US" dirty="0"/>
+              <a:t>-capability) to install all nodes</a:t>
+            </a:r>
+          </a:p>
+          <a:p>
+            <a:r>
+              <a:rPr lang="en-US" dirty="0"/>
+              <a:t>More granular groups to install only specific types</a:t>
+            </a:r>
+          </a:p>
+          <a:p>
+            <a:pPr lvl="1"/>
+            <a:r>
+              <a:rPr lang="en-US" dirty="0"/>
+              <a:t>Example: </a:t>
+            </a:r>
+          </a:p>
+          <a:p>
+            <a:pPr lvl="1"/>
+            <a:endParaRPr lang="en-US" dirty="0"/>
+          </a:p>
+          <a:p>
+            <a:pPr marL="342900" lvl="1" indent="0">
+              <a:buNone/>
+            </a:pPr>
+            <a:r>
+              <a:rPr lang="en-US" dirty="0"/>
+              <a:t>@</a:t>
+            </a:r>
+            <a:r>
+              <a:rPr lang="en-US" dirty="0" err="1"/>
+              <a:t>iotschema</a:t>
+            </a:r>
+            <a:r>
+              <a:rPr lang="en-US" dirty="0"/>
+              <a:t>/</a:t>
+            </a:r>
+            <a:r>
+              <a:rPr lang="en-US" dirty="0" err="1"/>
+              <a:t>ambientair</a:t>
+            </a:r>
+            <a:r>
+              <a:rPr lang="en-US" dirty="0"/>
+              <a:t>-capability</a:t>
+            </a:r>
+            <a:br>
+              <a:rPr lang="en-US" dirty="0"/>
+            </a:br>
+            <a:r>
+              <a:rPr lang="en-US" dirty="0"/>
+              <a:t>	|</a:t>
+            </a:r>
+          </a:p>
+          <a:p>
+            <a:pPr marL="342900" lvl="1" indent="0">
+              <a:buNone/>
+            </a:pPr>
+            <a:r>
+              <a:rPr lang="en-US" dirty="0"/>
+              <a:t>	 ⌞ @</a:t>
+            </a:r>
+            <a:r>
+              <a:rPr lang="en-US" dirty="0" err="1"/>
+              <a:t>iotschema</a:t>
+            </a:r>
+            <a:r>
+              <a:rPr lang="en-US" dirty="0"/>
+              <a:t>/</a:t>
+            </a:r>
+            <a:r>
+              <a:rPr lang="en-US" dirty="0" err="1"/>
+              <a:t>nitrogenconcentration</a:t>
+            </a:r>
+            <a:br>
+              <a:rPr lang="en-US" dirty="0"/>
+            </a:br>
+            <a:r>
+              <a:rPr lang="en-US" dirty="0"/>
+              <a:t>	 ⌞ @</a:t>
+            </a:r>
+            <a:r>
+              <a:rPr lang="en-US" dirty="0" err="1"/>
+              <a:t>iotschema</a:t>
+            </a:r>
+            <a:r>
+              <a:rPr lang="en-US" dirty="0"/>
+              <a:t>/</a:t>
+            </a:r>
+            <a:r>
+              <a:rPr lang="en-US" dirty="0" err="1"/>
+              <a:t>oxygenconcentration</a:t>
+            </a:r>
+            <a:br>
+              <a:rPr lang="en-US" dirty="0"/>
+            </a:br>
+            <a:r>
+              <a:rPr lang="en-US" dirty="0"/>
+              <a:t>	 ⌞ @</a:t>
+            </a:r>
+            <a:r>
+              <a:rPr lang="en-US" dirty="0" err="1"/>
+              <a:t>iotschema</a:t>
+            </a:r>
+            <a:r>
+              <a:rPr lang="en-US" dirty="0"/>
+              <a:t>/</a:t>
+            </a:r>
+            <a:r>
+              <a:rPr lang="en-US" dirty="0" err="1"/>
+              <a:t>carbondioxideconcentration</a:t>
+            </a:r>
+            <a:br>
+              <a:rPr lang="en-US" dirty="0"/>
+            </a:br>
+            <a:r>
+              <a:rPr lang="en-US" dirty="0"/>
+              <a:t>	 ⌞ @</a:t>
+            </a:r>
+            <a:r>
+              <a:rPr lang="en-US" dirty="0" err="1"/>
+              <a:t>iotschema</a:t>
+            </a:r>
+            <a:r>
+              <a:rPr lang="en-US" dirty="0"/>
+              <a:t>/</a:t>
+            </a:r>
+            <a:r>
+              <a:rPr lang="en-US" dirty="0" err="1"/>
+              <a:t>argonconcentration</a:t>
+            </a:r>
+            <a:endParaRPr lang="en-US" dirty="0"/>
+          </a:p>
+        </p:txBody>
+      </p:sp>
+    </p:spTree>
+    <p:extLst>
+      <p:ext uri="{BB962C8B-B14F-4D97-AF65-F5344CB8AC3E}">
+        <p14:creationId xmlns:p14="http://schemas.microsoft.com/office/powerpoint/2010/main" val="3460003188"/>
+      </p:ext>
+    </p:extLst>
+  </p:cSld>
+  <p:clrMapOvr>
+    <a:masterClrMapping/>
+  </p:clrMapOvr>
+</p:sld>
+</file>
+
+<file path=ppt/slides/slide13.xml><?xml version="1.0" encoding="utf-8"?>
+<p:sld xmlns:a="http://schemas.openxmlformats.org/drawingml/2006/main" xmlns:r="http://schemas.openxmlformats.org/officeDocument/2006/relationships" xmlns:p="http://schemas.openxmlformats.org/presentationml/2006/main">
+  <p:cSld>
+    <p:spTree>
+      <p:nvGrpSpPr>
+        <p:cNvPr id="1" name=""/>
+        <p:cNvGrpSpPr/>
+        <p:nvPr/>
+      </p:nvGrpSpPr>
+      <p:grpSpPr>
+        <a:xfrm>
+          <a:off x="0" y="0"/>
+          <a:ext cx="0" cy="0"/>
+          <a:chOff x="0" y="0"/>
+          <a:chExt cx="0" cy="0"/>
+        </a:xfrm>
+      </p:grpSpPr>
+      <p:sp>
+        <p:nvSpPr>
           <p:cNvPr id="2" name="Title 1"/>
           <p:cNvSpPr>
             <a:spLocks noGrp="1"/>
@@ -3850,10 +4199,518 @@
           <a:lstStyle/>
           <a:p>
             <a:r>
-              <a:rPr lang="en-US" dirty="0" smtClean="0"/>
+              <a:rPr lang="en-US" dirty="0" err="1"/>
+              <a:t>Schema.org</a:t>
+            </a:r>
+            <a:r>
+              <a:rPr lang="en-US" dirty="0"/>
+              <a:t> Integration</a:t>
+            </a:r>
+          </a:p>
+        </p:txBody>
+      </p:sp>
+      <p:sp>
+        <p:nvSpPr>
+          <p:cNvPr id="3" name="Content Placeholder 2"/>
+          <p:cNvSpPr>
+            <a:spLocks noGrp="1"/>
+          </p:cNvSpPr>
+          <p:nvPr>
+            <p:ph idx="1"/>
+          </p:nvPr>
+        </p:nvSpPr>
+        <p:spPr/>
+        <p:txBody>
+          <a:bodyPr>
+            <a:normAutofit lnSpcReduction="10000"/>
+          </a:bodyPr>
+          <a:lstStyle/>
+          <a:p>
+            <a:r>
+              <a:rPr lang="en-US" dirty="0"/>
+              <a:t>Class names Event, Action, Property conflict</a:t>
+            </a:r>
+          </a:p>
+          <a:p>
+            <a:r>
+              <a:rPr lang="en-US" dirty="0" err="1"/>
+              <a:t>iotschema</a:t>
+            </a:r>
+            <a:r>
+              <a:rPr lang="en-US" dirty="0"/>
+              <a:t> has diverse semantic types for objects, </a:t>
+            </a:r>
+            <a:r>
+              <a:rPr lang="en-US" dirty="0" err="1"/>
+              <a:t>schema.org</a:t>
+            </a:r>
+            <a:r>
+              <a:rPr lang="en-US" dirty="0"/>
+              <a:t> has diverse property types</a:t>
+            </a:r>
+          </a:p>
+          <a:p>
+            <a:r>
+              <a:rPr lang="en-US" dirty="0"/>
+              <a:t>Property types could be synthesized from objects but</a:t>
+            </a:r>
+            <a:r>
+              <a:rPr lang="mr-IN" dirty="0"/>
+              <a:t>…</a:t>
+            </a:r>
+            <a:endParaRPr lang="en-US" dirty="0"/>
+          </a:p>
+          <a:p>
+            <a:r>
+              <a:rPr lang="en-US" dirty="0"/>
+              <a:t> </a:t>
+            </a:r>
+            <a:r>
+              <a:rPr lang="en-US" dirty="0" err="1"/>
+              <a:t>iotschema</a:t>
+            </a:r>
+            <a:r>
+              <a:rPr lang="en-US" dirty="0"/>
+              <a:t> will potentially define hundreds of types for physical quantities (temperature, humidity, voltage, acceleration</a:t>
+            </a:r>
+            <a:r>
+              <a:rPr lang="mr-IN" dirty="0"/>
+              <a:t>…</a:t>
+            </a:r>
+            <a:r>
+              <a:rPr lang="en-US" dirty="0"/>
+              <a:t>), control affordances (open/close, brightness, color control, camera controls, operating modes</a:t>
+            </a:r>
+            <a:r>
+              <a:rPr lang="mr-IN" dirty="0"/>
+              <a:t>…</a:t>
+            </a:r>
+            <a:r>
+              <a:rPr lang="en-US" dirty="0"/>
+              <a:t>), and features of interest (rooms, machines</a:t>
+            </a:r>
+            <a:r>
+              <a:rPr lang="mr-IN" dirty="0"/>
+              <a:t>…</a:t>
+            </a:r>
+            <a:r>
+              <a:rPr lang="en-US" dirty="0"/>
+              <a:t>)</a:t>
+            </a:r>
+          </a:p>
+        </p:txBody>
+      </p:sp>
+    </p:spTree>
+    <p:extLst>
+      <p:ext uri="{BB962C8B-B14F-4D97-AF65-F5344CB8AC3E}">
+        <p14:creationId xmlns:p14="http://schemas.microsoft.com/office/powerpoint/2010/main" val="1624716396"/>
+      </p:ext>
+    </p:extLst>
+  </p:cSld>
+  <p:clrMapOvr>
+    <a:masterClrMapping/>
+  </p:clrMapOvr>
+</p:sld>
+</file>
+
+<file path=ppt/slides/slide14.xml><?xml version="1.0" encoding="utf-8"?>
+<p:sld xmlns:a="http://schemas.openxmlformats.org/drawingml/2006/main" xmlns:r="http://schemas.openxmlformats.org/officeDocument/2006/relationships" xmlns:p="http://schemas.openxmlformats.org/presentationml/2006/main">
+  <p:cSld>
+    <p:spTree>
+      <p:nvGrpSpPr>
+        <p:cNvPr id="1" name=""/>
+        <p:cNvGrpSpPr/>
+        <p:nvPr/>
+      </p:nvGrpSpPr>
+      <p:grpSpPr>
+        <a:xfrm>
+          <a:off x="0" y="0"/>
+          <a:ext cx="0" cy="0"/>
+          <a:chOff x="0" y="0"/>
+          <a:chExt cx="0" cy="0"/>
+        </a:xfrm>
+      </p:grpSpPr>
+      <p:sp>
+        <p:nvSpPr>
+          <p:cNvPr id="2" name="Title 1"/>
+          <p:cNvSpPr>
+            <a:spLocks noGrp="1"/>
+          </p:cNvSpPr>
+          <p:nvPr>
+            <p:ph type="title"/>
+          </p:nvPr>
+        </p:nvSpPr>
+        <p:spPr/>
+        <p:txBody>
+          <a:bodyPr/>
+          <a:lstStyle/>
+          <a:p>
+            <a:r>
+              <a:rPr lang="en-US" dirty="0" err="1"/>
+              <a:t>Schema.org</a:t>
+            </a:r>
+            <a:r>
+              <a:rPr lang="en-US" dirty="0"/>
+              <a:t> Integration</a:t>
+            </a:r>
+          </a:p>
+        </p:txBody>
+      </p:sp>
+      <p:sp>
+        <p:nvSpPr>
+          <p:cNvPr id="3" name="Content Placeholder 2"/>
+          <p:cNvSpPr>
+            <a:spLocks noGrp="1"/>
+          </p:cNvSpPr>
+          <p:nvPr>
+            <p:ph idx="1"/>
+          </p:nvPr>
+        </p:nvSpPr>
+        <p:spPr/>
+        <p:txBody>
+          <a:bodyPr/>
+          <a:lstStyle/>
+          <a:p>
+            <a:r>
+              <a:rPr lang="en-US" dirty="0"/>
+              <a:t>The </a:t>
+            </a:r>
+            <a:r>
+              <a:rPr lang="en-US" dirty="0" err="1"/>
+              <a:t>WoT</a:t>
+            </a:r>
+            <a:r>
+              <a:rPr lang="en-US" dirty="0"/>
+              <a:t> use case is based on annotation consisting of RDF @type statements that point to URIs of defined terms for specialized types that conform to the classes in the meta-model</a:t>
+            </a:r>
+          </a:p>
+          <a:p>
+            <a:r>
+              <a:rPr lang="en-US" dirty="0"/>
+              <a:t>These meta-model classes would only add about 6 new property types to </a:t>
+            </a:r>
+            <a:r>
+              <a:rPr lang="en-US" dirty="0" err="1"/>
+              <a:t>schema.org</a:t>
+            </a:r>
+            <a:endParaRPr lang="en-US" dirty="0"/>
+          </a:p>
+          <a:p>
+            <a:pPr lvl="1"/>
+            <a:r>
+              <a:rPr lang="en-US" dirty="0" err="1"/>
+              <a:t>iotCapability</a:t>
+            </a:r>
+            <a:r>
+              <a:rPr lang="en-US" dirty="0"/>
+              <a:t>, </a:t>
+            </a:r>
+            <a:r>
+              <a:rPr lang="en-US" dirty="0" err="1"/>
+              <a:t>iotEvent</a:t>
+            </a:r>
+            <a:r>
+              <a:rPr lang="en-US" dirty="0"/>
+              <a:t>, </a:t>
+            </a:r>
+            <a:r>
+              <a:rPr lang="en-US" dirty="0" err="1"/>
+              <a:t>iotAction</a:t>
+            </a:r>
+            <a:r>
+              <a:rPr lang="en-US" dirty="0"/>
+              <a:t>, </a:t>
+            </a:r>
+            <a:r>
+              <a:rPr lang="en-US" dirty="0" err="1"/>
+              <a:t>iotProperty</a:t>
+            </a:r>
+            <a:r>
+              <a:rPr lang="en-US" dirty="0"/>
+              <a:t>, </a:t>
+            </a:r>
+            <a:r>
+              <a:rPr lang="en-US" dirty="0" err="1"/>
+              <a:t>iotData</a:t>
+            </a:r>
+            <a:r>
+              <a:rPr lang="en-US" dirty="0"/>
+              <a:t>, </a:t>
+            </a:r>
+            <a:r>
+              <a:rPr lang="en-US" dirty="0" err="1"/>
+              <a:t>iotFeatureofInterest</a:t>
+            </a:r>
+            <a:endParaRPr lang="en-US" dirty="0"/>
+          </a:p>
+          <a:p>
+            <a:pPr lvl="1"/>
+            <a:r>
+              <a:rPr lang="en-US" dirty="0"/>
+              <a:t>new types like </a:t>
+            </a:r>
+            <a:r>
+              <a:rPr lang="en-US" dirty="0" err="1"/>
+              <a:t>iotInterface</a:t>
+            </a:r>
+            <a:r>
+              <a:rPr lang="en-US" dirty="0"/>
+              <a:t>, </a:t>
+            </a:r>
+            <a:r>
+              <a:rPr lang="en-US" dirty="0" err="1"/>
+              <a:t>iotThing</a:t>
+            </a:r>
+            <a:r>
+              <a:rPr lang="en-US" dirty="0"/>
+              <a:t>, etc. as needed</a:t>
+            </a:r>
+          </a:p>
+        </p:txBody>
+      </p:sp>
+    </p:spTree>
+    <p:extLst>
+      <p:ext uri="{BB962C8B-B14F-4D97-AF65-F5344CB8AC3E}">
+        <p14:creationId xmlns:p14="http://schemas.microsoft.com/office/powerpoint/2010/main" val="192793757"/>
+      </p:ext>
+    </p:extLst>
+  </p:cSld>
+  <p:clrMapOvr>
+    <a:masterClrMapping/>
+  </p:clrMapOvr>
+</p:sld>
+</file>
+
+<file path=ppt/slides/slide15.xml><?xml version="1.0" encoding="utf-8"?>
+<p:sld xmlns:a="http://schemas.openxmlformats.org/drawingml/2006/main" xmlns:r="http://schemas.openxmlformats.org/officeDocument/2006/relationships" xmlns:p="http://schemas.openxmlformats.org/presentationml/2006/main">
+  <p:cSld>
+    <p:spTree>
+      <p:nvGrpSpPr>
+        <p:cNvPr id="1" name=""/>
+        <p:cNvGrpSpPr/>
+        <p:nvPr/>
+      </p:nvGrpSpPr>
+      <p:grpSpPr>
+        <a:xfrm>
+          <a:off x="0" y="0"/>
+          <a:ext cx="0" cy="0"/>
+          <a:chOff x="0" y="0"/>
+          <a:chExt cx="0" cy="0"/>
+        </a:xfrm>
+      </p:grpSpPr>
+      <p:sp>
+        <p:nvSpPr>
+          <p:cNvPr id="2" name="Title 1"/>
+          <p:cNvSpPr>
+            <a:spLocks noGrp="1"/>
+          </p:cNvSpPr>
+          <p:nvPr>
+            <p:ph type="title"/>
+          </p:nvPr>
+        </p:nvSpPr>
+        <p:spPr>
+          <a:xfrm>
+            <a:off x="628650" y="126135"/>
+            <a:ext cx="7886700" cy="1325563"/>
+          </a:xfrm>
+        </p:spPr>
+        <p:txBody>
+          <a:bodyPr/>
+          <a:lstStyle/>
+          <a:p>
+            <a:r>
+              <a:rPr lang="en-US" dirty="0" err="1"/>
+              <a:t>Schema.org</a:t>
+            </a:r>
+            <a:r>
+              <a:rPr lang="en-US" dirty="0"/>
+              <a:t> Integration</a:t>
+            </a:r>
+          </a:p>
+        </p:txBody>
+      </p:sp>
+      <p:sp>
+        <p:nvSpPr>
+          <p:cNvPr id="3" name="Content Placeholder 2"/>
+          <p:cNvSpPr>
+            <a:spLocks noGrp="1"/>
+          </p:cNvSpPr>
+          <p:nvPr>
+            <p:ph idx="1"/>
+          </p:nvPr>
+        </p:nvSpPr>
+        <p:spPr>
+          <a:xfrm>
+            <a:off x="628650" y="1451697"/>
+            <a:ext cx="7985414" cy="4637375"/>
+          </a:xfrm>
+        </p:spPr>
+        <p:txBody>
+          <a:bodyPr/>
+          <a:lstStyle/>
+          <a:p>
+            <a:r>
+              <a:rPr lang="en-US" dirty="0"/>
+              <a:t>There is a potential example pattern in </a:t>
+            </a:r>
+            <a:r>
+              <a:rPr lang="en-US" dirty="0" err="1"/>
+              <a:t>schema.org</a:t>
+            </a:r>
+            <a:endParaRPr lang="en-US" dirty="0"/>
+          </a:p>
+          <a:p>
+            <a:pPr lvl="1"/>
+            <a:r>
+              <a:rPr lang="en-US" dirty="0" err="1"/>
+              <a:t>MedicalEntity</a:t>
+            </a:r>
+            <a:r>
+              <a:rPr lang="en-US" dirty="0"/>
+              <a:t>, with about 7 property types</a:t>
+            </a:r>
+          </a:p>
+          <a:p>
+            <a:r>
+              <a:rPr lang="en-US" dirty="0"/>
+              <a:t>Likewise, an instance of </a:t>
+            </a:r>
+            <a:r>
+              <a:rPr lang="en-US" dirty="0" err="1"/>
+              <a:t>IoT</a:t>
+            </a:r>
+            <a:r>
+              <a:rPr lang="en-US" dirty="0"/>
+              <a:t> Schema would contain some set of </a:t>
+            </a:r>
+            <a:r>
+              <a:rPr lang="en-US" dirty="0" err="1"/>
+              <a:t>iotCapability</a:t>
+            </a:r>
+            <a:r>
+              <a:rPr lang="en-US" dirty="0"/>
+              <a:t>, </a:t>
+            </a:r>
+            <a:r>
+              <a:rPr lang="en-US" dirty="0" err="1"/>
+              <a:t>iotAction</a:t>
+            </a:r>
+            <a:r>
+              <a:rPr lang="en-US" dirty="0"/>
+              <a:t>, </a:t>
+            </a:r>
+            <a:r>
+              <a:rPr lang="en-US" dirty="0" err="1"/>
+              <a:t>iotProperty</a:t>
+            </a:r>
+            <a:r>
+              <a:rPr lang="en-US" dirty="0"/>
+              <a:t>, </a:t>
+            </a:r>
+            <a:r>
+              <a:rPr lang="en-US" dirty="0" err="1"/>
+              <a:t>iotEvent</a:t>
+            </a:r>
+            <a:r>
+              <a:rPr lang="en-US" dirty="0"/>
+              <a:t>, </a:t>
+            </a:r>
+            <a:r>
+              <a:rPr lang="en-US" dirty="0" err="1"/>
+              <a:t>iotFeatureOfInterest</a:t>
+            </a:r>
+            <a:r>
+              <a:rPr lang="en-US" dirty="0"/>
+              <a:t> properties</a:t>
+            </a:r>
+          </a:p>
+          <a:p>
+            <a:r>
+              <a:rPr lang="en-US" dirty="0"/>
+              <a:t>Specialization of </a:t>
+            </a:r>
+            <a:r>
+              <a:rPr lang="en-US" dirty="0" err="1"/>
+              <a:t>iot</a:t>
+            </a:r>
+            <a:r>
+              <a:rPr lang="en-US" dirty="0"/>
+              <a:t> types would happen at the next level in the graph </a:t>
+            </a:r>
+            <a:r>
+              <a:rPr lang="mr-IN" dirty="0"/>
+              <a:t>–</a:t>
+            </a:r>
+            <a:r>
+              <a:rPr lang="en-US" dirty="0"/>
+              <a:t> hosted in a separate namespace </a:t>
+            </a:r>
+          </a:p>
+          <a:p>
+            <a:pPr lvl="1"/>
+            <a:r>
+              <a:rPr lang="en-US" dirty="0"/>
+              <a:t>URIs that point to accepted specialized definitions in one or more specialized namespaces</a:t>
+            </a:r>
+          </a:p>
+          <a:p>
+            <a:pPr lvl="1"/>
+            <a:r>
+              <a:rPr lang="en-US" dirty="0"/>
+              <a:t>lighting controls, thermostats, etc. that conform to the base types but have their own properties </a:t>
+            </a:r>
+          </a:p>
+        </p:txBody>
+      </p:sp>
+    </p:spTree>
+    <p:extLst>
+      <p:ext uri="{BB962C8B-B14F-4D97-AF65-F5344CB8AC3E}">
+        <p14:creationId xmlns:p14="http://schemas.microsoft.com/office/powerpoint/2010/main" val="1879334223"/>
+      </p:ext>
+    </p:extLst>
+  </p:cSld>
+  <p:clrMapOvr>
+    <a:masterClrMapping/>
+  </p:clrMapOvr>
+</p:sld>
+</file>
+
+<file path=ppt/slides/slide16.xml><?xml version="1.0" encoding="utf-8"?>
+<p:sld xmlns:a="http://schemas.openxmlformats.org/drawingml/2006/main" xmlns:r="http://schemas.openxmlformats.org/officeDocument/2006/relationships" xmlns:p="http://schemas.openxmlformats.org/presentationml/2006/main">
+  <p:cSld>
+    <p:spTree>
+      <p:nvGrpSpPr>
+        <p:cNvPr id="1" name=""/>
+        <p:cNvGrpSpPr/>
+        <p:nvPr/>
+      </p:nvGrpSpPr>
+      <p:grpSpPr>
+        <a:xfrm>
+          <a:off x="0" y="0"/>
+          <a:ext cx="0" cy="0"/>
+          <a:chOff x="0" y="0"/>
+          <a:chExt cx="0" cy="0"/>
+        </a:xfrm>
+      </p:grpSpPr>
+      <p:sp>
+        <p:nvSpPr>
+          <p:cNvPr id="2" name="Title 1"/>
+          <p:cNvSpPr>
+            <a:spLocks noGrp="1"/>
+          </p:cNvSpPr>
+          <p:nvPr>
+            <p:ph type="title"/>
+          </p:nvPr>
+        </p:nvSpPr>
+        <p:spPr/>
+        <p:txBody>
+          <a:bodyPr/>
+          <a:lstStyle/>
+          <a:p>
+            <a:r>
+              <a:rPr lang="en-US" dirty="0"/>
               <a:t>Conclusion</a:t>
             </a:r>
-            <a:endParaRPr lang="en-US" dirty="0"/>
           </a:p>
         </p:txBody>
       </p:sp>
@@ -3873,16 +4730,15 @@
           <a:lstStyle/>
           <a:p>
             <a:r>
-              <a:rPr lang="en-US" dirty="0" smtClean="0"/>
+              <a:rPr lang="en-US" dirty="0"/>
               <a:t>Summary</a:t>
             </a:r>
           </a:p>
           <a:p>
             <a:r>
-              <a:rPr lang="en-US" dirty="0" smtClean="0"/>
+              <a:rPr lang="en-US" dirty="0"/>
               <a:t>AOB</a:t>
             </a:r>
-            <a:endParaRPr lang="en-US" dirty="0"/>
           </a:p>
         </p:txBody>
       </p:sp>
@@ -3932,10 +4788,9 @@
           <a:lstStyle/>
           <a:p>
             <a:r>
-              <a:rPr lang="en-US" dirty="0" smtClean="0"/>
+              <a:rPr lang="en-US" dirty="0"/>
               <a:t>Agenda</a:t>
             </a:r>
-            <a:endParaRPr lang="en-US" dirty="0"/>
           </a:p>
         </p:txBody>
       </p:sp>
@@ -3960,56 +4815,48 @@
           <a:lstStyle/>
           <a:p>
             <a:r>
-              <a:rPr lang="en-US" dirty="0" smtClean="0"/>
+              <a:rPr lang="en-US" dirty="0"/>
               <a:t>Agenda review</a:t>
             </a:r>
           </a:p>
           <a:p>
             <a:r>
-              <a:rPr lang="en-US" dirty="0" smtClean="0"/>
+              <a:rPr lang="en-US" dirty="0"/>
               <a:t>Announcements </a:t>
             </a:r>
             <a:r>
-              <a:rPr lang="mr-IN" dirty="0" smtClean="0"/>
+              <a:rPr lang="mr-IN" dirty="0"/>
               <a:t>–</a:t>
             </a:r>
             <a:r>
-              <a:rPr lang="en-US" dirty="0" smtClean="0"/>
+              <a:rPr lang="en-US" dirty="0"/>
               <a:t> T2TRG Workshop on Data Models and One Data Model + WISHI Hackathon</a:t>
             </a:r>
           </a:p>
           <a:p>
             <a:r>
-              <a:rPr lang="en-US" dirty="0" smtClean="0"/>
+              <a:rPr lang="en-US" dirty="0"/>
               <a:t>Recent developments </a:t>
             </a:r>
             <a:r>
-              <a:rPr lang="mr-IN" dirty="0" smtClean="0"/>
+              <a:rPr lang="mr-IN" dirty="0"/>
               <a:t>–</a:t>
             </a:r>
             <a:r>
-              <a:rPr lang="en-US" dirty="0" smtClean="0"/>
+              <a:rPr lang="en-US" dirty="0"/>
               <a:t> Project CHIP</a:t>
             </a:r>
           </a:p>
           <a:p>
             <a:r>
-              <a:rPr lang="en-US" dirty="0" smtClean="0"/>
-              <a:t>Proposal </a:t>
-            </a:r>
-            <a:r>
-              <a:rPr lang="en-US" dirty="0"/>
-              <a:t>for adding a thing class</a:t>
-            </a:r>
-          </a:p>
-          <a:p>
-            <a:r>
-              <a:rPr lang="en-US" dirty="0" smtClean="0"/>
-              <a:t>Availability </a:t>
-            </a:r>
-            <a:r>
-              <a:rPr lang="en-US" dirty="0"/>
-              <a:t>of iotschema4Node-RED over </a:t>
+              <a:rPr lang="en-US" dirty="0"/>
+              <a:t>Proposal for adding a thing class</a:t>
+            </a:r>
+          </a:p>
+          <a:p>
+            <a:r>
+              <a:rPr lang="en-US" dirty="0"/>
+              <a:t>Availability of iotschema4Node-RED over </a:t>
             </a:r>
             <a:r>
               <a:rPr lang="en-US" dirty="0" err="1"/>
@@ -4019,24 +4866,23 @@
           </a:p>
           <a:p>
             <a:r>
-              <a:rPr lang="en-US" dirty="0" smtClean="0"/>
+              <a:rPr lang="en-US" dirty="0"/>
               <a:t>Hosting and </a:t>
             </a:r>
             <a:r>
-              <a:rPr lang="en-US" dirty="0" err="1" smtClean="0"/>
+              <a:rPr lang="en-US" dirty="0" err="1"/>
               <a:t>schema.org</a:t>
             </a:r>
             <a:r>
-              <a:rPr lang="en-US" dirty="0" smtClean="0"/>
+              <a:rPr lang="en-US" dirty="0"/>
               <a:t> extension</a:t>
             </a:r>
           </a:p>
           <a:p>
             <a:r>
-              <a:rPr lang="en-US" dirty="0" smtClean="0"/>
+              <a:rPr lang="en-US" dirty="0"/>
               <a:t>AOB</a:t>
             </a:r>
-            <a:endParaRPr lang="en-US" dirty="0"/>
           </a:p>
         </p:txBody>
       </p:sp>
@@ -4050,13 +4896,6 @@
   <p:clrMapOvr>
     <a:masterClrMapping/>
   </p:clrMapOvr>
-  <p:timing>
-    <p:tnLst>
-      <p:par>
-        <p:cTn id="1" dur="indefinite" restart="never" nodeType="tmRoot"/>
-      </p:par>
-    </p:tnLst>
-  </p:timing>
 </p:sld>
 </file>
 
@@ -4098,10 +4937,9 @@
           <a:lstStyle/>
           <a:p>
             <a:r>
-              <a:rPr lang="en-US" dirty="0" smtClean="0"/>
+              <a:rPr lang="en-US" dirty="0"/>
               <a:t>Announcements</a:t>
             </a:r>
-            <a:endParaRPr lang="en-US" dirty="0"/>
           </a:p>
         </p:txBody>
       </p:sp>
@@ -4121,100 +4959,99 @@
           <a:lstStyle/>
           <a:p>
             <a:r>
-              <a:rPr lang="en-US" dirty="0" smtClean="0"/>
+              <a:rPr lang="en-US" dirty="0"/>
               <a:t>W3C </a:t>
             </a:r>
             <a:r>
-              <a:rPr lang="en-US" dirty="0" err="1" smtClean="0"/>
+              <a:rPr lang="en-US" dirty="0" err="1"/>
               <a:t>WoT</a:t>
             </a:r>
             <a:r>
-              <a:rPr lang="en-US" dirty="0" smtClean="0"/>
+              <a:rPr lang="en-US" dirty="0"/>
               <a:t> Online Virtual F2F March 16-18</a:t>
             </a:r>
           </a:p>
           <a:p>
             <a:r>
-              <a:rPr lang="en-US" dirty="0" smtClean="0"/>
+              <a:rPr lang="en-US" dirty="0"/>
               <a:t>T2TRG Workshop March 20 at IETF 107 Vancouver</a:t>
             </a:r>
           </a:p>
           <a:p>
             <a:pPr lvl="1"/>
             <a:r>
-              <a:rPr lang="en-US" dirty="0" smtClean="0"/>
+              <a:rPr lang="en-US" dirty="0"/>
               <a:t>Technical review of SDF language (</a:t>
             </a:r>
             <a:r>
-              <a:rPr lang="en-US" dirty="0" err="1" smtClean="0"/>
+              <a:rPr lang="en-US" dirty="0" err="1"/>
               <a:t>OneDM</a:t>
             </a:r>
             <a:r>
-              <a:rPr lang="en-US" dirty="0" smtClean="0"/>
+              <a:rPr lang="en-US" dirty="0"/>
               <a:t>)</a:t>
             </a:r>
           </a:p>
           <a:p>
             <a:r>
-              <a:rPr lang="en-US" dirty="0" smtClean="0"/>
+              <a:rPr lang="en-US" dirty="0"/>
               <a:t>WISHI Hackathon March 21 and 22 at IETF 107</a:t>
             </a:r>
           </a:p>
           <a:p>
             <a:pPr lvl="1"/>
             <a:r>
-              <a:rPr lang="en-US" dirty="0" smtClean="0"/>
+              <a:rPr lang="en-US" dirty="0"/>
               <a:t>Semantic Proxy using W3C </a:t>
             </a:r>
             <a:r>
-              <a:rPr lang="en-US" dirty="0" err="1" smtClean="0"/>
+              <a:rPr lang="en-US" dirty="0" err="1"/>
               <a:t>WoT</a:t>
             </a:r>
             <a:r>
-              <a:rPr lang="en-US" dirty="0" smtClean="0"/>
+              <a:rPr lang="en-US" dirty="0"/>
               <a:t> and </a:t>
             </a:r>
             <a:r>
-              <a:rPr lang="en-US" dirty="0" err="1" smtClean="0"/>
+              <a:rPr lang="en-US" dirty="0" err="1"/>
               <a:t>iotschema</a:t>
             </a:r>
             <a:r>
-              <a:rPr lang="en-US" dirty="0" smtClean="0"/>
+              <a:rPr lang="en-US" dirty="0"/>
               <a:t> annotation from </a:t>
             </a:r>
             <a:r>
-              <a:rPr lang="en-US" dirty="0" err="1" smtClean="0"/>
+              <a:rPr lang="en-US" dirty="0" err="1"/>
               <a:t>OneDM</a:t>
             </a:r>
             <a:r>
-              <a:rPr lang="en-US" dirty="0" smtClean="0"/>
+              <a:rPr lang="en-US" dirty="0"/>
               <a:t> definitions</a:t>
             </a:r>
           </a:p>
           <a:p>
             <a:r>
-              <a:rPr lang="en-US" dirty="0" err="1" smtClean="0"/>
+              <a:rPr lang="en-US" dirty="0" err="1"/>
               <a:t>OneDM</a:t>
             </a:r>
             <a:r>
-              <a:rPr lang="en-US" dirty="0" smtClean="0"/>
+              <a:rPr lang="en-US" dirty="0"/>
               <a:t> F2F late April, Qualcomm in San Diego</a:t>
             </a:r>
           </a:p>
           <a:p>
             <a:r>
-              <a:rPr lang="en-US" dirty="0" smtClean="0"/>
+              <a:rPr lang="en-US" dirty="0"/>
               <a:t>W3C </a:t>
             </a:r>
             <a:r>
-              <a:rPr lang="en-US" dirty="0" err="1" smtClean="0"/>
+              <a:rPr lang="en-US" dirty="0" err="1"/>
               <a:t>WoT</a:t>
             </a:r>
             <a:r>
-              <a:rPr lang="en-US" dirty="0" smtClean="0"/>
+              <a:rPr lang="en-US" dirty="0"/>
               <a:t> Helsinki June 6-11 with T2TRG </a:t>
             </a:r>
-            <a:endParaRPr lang="en-US" dirty="0"/>
           </a:p>
         </p:txBody>
       </p:sp>
@@ -4269,10 +5106,9 @@
           <a:lstStyle/>
           <a:p>
             <a:r>
-              <a:rPr lang="en-US" dirty="0" smtClean="0"/>
+              <a:rPr lang="en-US" dirty="0"/>
               <a:t>Project CHIP</a:t>
             </a:r>
-            <a:endParaRPr lang="en-US" dirty="0"/>
           </a:p>
         </p:txBody>
       </p:sp>
@@ -4297,53 +5133,49 @@
           <a:lstStyle/>
           <a:p>
             <a:r>
-              <a:rPr lang="en-US" dirty="0" smtClean="0"/>
+              <a:rPr lang="en-US" dirty="0"/>
               <a:t>Google and Apple joined </a:t>
             </a:r>
             <a:r>
-              <a:rPr lang="en-US" dirty="0" err="1" smtClean="0"/>
+              <a:rPr lang="en-US" dirty="0" err="1"/>
               <a:t>Zigbee</a:t>
             </a:r>
             <a:r>
-              <a:rPr lang="en-US" dirty="0" smtClean="0"/>
+              <a:rPr lang="en-US" dirty="0"/>
               <a:t> Alliance to create a new interoperable network standard for connected homes </a:t>
             </a:r>
             <a:r>
-              <a:rPr lang="mr-IN" dirty="0" smtClean="0"/>
+              <a:rPr lang="mr-IN" dirty="0"/>
               <a:t>–</a:t>
             </a:r>
             <a:r>
-              <a:rPr lang="en-US" dirty="0" smtClean="0"/>
-              <a:t> Project Connected </a:t>
-            </a:r>
-            <a:r>
-              <a:rPr lang="en-US" dirty="0"/>
-              <a:t>Home over IP</a:t>
-            </a:r>
-          </a:p>
-          <a:p>
-            <a:r>
-              <a:rPr lang="en-US" dirty="0" smtClean="0"/>
+              <a:rPr lang="en-US" dirty="0"/>
+              <a:t> Project Connected Home over IP</a:t>
+            </a:r>
+          </a:p>
+          <a:p>
+            <a:r>
+              <a:rPr lang="en-US" dirty="0"/>
               <a:t>Deliver a standard, open source reference stack, and certification program for interoperable devices </a:t>
             </a:r>
           </a:p>
           <a:p>
             <a:r>
-              <a:rPr lang="en-US" dirty="0" smtClean="0"/>
+              <a:rPr lang="en-US" dirty="0"/>
               <a:t>What it means to </a:t>
             </a:r>
             <a:r>
-              <a:rPr lang="en-US" dirty="0" err="1" smtClean="0"/>
+              <a:rPr lang="en-US" dirty="0" err="1"/>
               <a:t>iotschema</a:t>
             </a:r>
             <a:r>
-              <a:rPr lang="en-US" dirty="0" smtClean="0"/>
+              <a:rPr lang="en-US" dirty="0"/>
               <a:t> - standardized data models for connected home devices + Event, Action, Property model + open source license</a:t>
             </a:r>
           </a:p>
           <a:p>
             <a:r>
-              <a:rPr lang="en-US" dirty="0" smtClean="0"/>
+              <a:rPr lang="en-US" dirty="0"/>
               <a:t>Still need to address system level modeling with location, context , behavior + application domains</a:t>
             </a:r>
           </a:p>
@@ -4359,13 +5191,6 @@
   <p:clrMapOvr>
     <a:masterClrMapping/>
   </p:clrMapOvr>
-  <p:timing>
-    <p:tnLst>
-      <p:par>
-        <p:cTn id="1" dur="indefinite" restart="never" nodeType="tmRoot"/>
-      </p:par>
-    </p:tnLst>
-  </p:timing>
 </p:sld>
 </file>
 
@@ -4402,10 +5227,9 @@
           <a:lstStyle/>
           <a:p>
             <a:r>
-              <a:rPr lang="en-US" dirty="0" smtClean="0"/>
+              <a:rPr lang="en-US" dirty="0"/>
               <a:t>Thing Class</a:t>
             </a:r>
-            <a:endParaRPr lang="en-US" dirty="0"/>
           </a:p>
         </p:txBody>
       </p:sp>
@@ -4426,93 +5250,94 @@
           </a:xfrm>
         </p:spPr>
         <p:txBody>
-          <a:bodyPr/>
-          <a:lstStyle/>
-          <a:p>
-            <a:r>
-              <a:rPr lang="en-US" dirty="0" smtClean="0"/>
+          <a:bodyPr>
+            <a:normAutofit lnSpcReduction="10000"/>
+          </a:bodyPr>
+          <a:lstStyle/>
+          <a:p>
+            <a:r>
+              <a:rPr lang="en-US" dirty="0"/>
               <a:t>Encapsulate reusable Capabilities</a:t>
             </a:r>
           </a:p>
           <a:p>
             <a:pPr lvl="1"/>
             <a:r>
-              <a:rPr lang="en-US" dirty="0" smtClean="0"/>
+              <a:rPr lang="en-US" dirty="0"/>
               <a:t>On/Off with state Property, Commands, and Events</a:t>
             </a:r>
           </a:p>
           <a:p>
             <a:pPr lvl="1"/>
             <a:r>
-              <a:rPr lang="en-US" dirty="0" smtClean="0"/>
+              <a:rPr lang="en-US" dirty="0"/>
               <a:t>Compose Air Conditioner Thing from </a:t>
             </a:r>
             <a:r>
-              <a:rPr lang="en-US" dirty="0" err="1" smtClean="0"/>
+              <a:rPr lang="en-US" dirty="0" err="1"/>
               <a:t>OnOff</a:t>
             </a:r>
             <a:r>
-              <a:rPr lang="en-US" dirty="0" smtClean="0"/>
+              <a:rPr lang="en-US" dirty="0"/>
               <a:t>, Mode, Speed, etc. as reusable Capabilities</a:t>
             </a:r>
           </a:p>
           <a:p>
             <a:r>
-              <a:rPr lang="en-US" dirty="0" smtClean="0"/>
+              <a:rPr lang="en-US" dirty="0"/>
               <a:t>Reusable compositions of Capabilities</a:t>
             </a:r>
           </a:p>
           <a:p>
             <a:pPr lvl="1"/>
             <a:r>
-              <a:rPr lang="en-US" dirty="0" smtClean="0"/>
+              <a:rPr lang="en-US" dirty="0"/>
               <a:t>An Outlet unit for a multi-outlet strip</a:t>
             </a:r>
           </a:p>
           <a:p>
             <a:pPr lvl="1"/>
             <a:r>
-              <a:rPr lang="en-US" dirty="0" smtClean="0"/>
+              <a:rPr lang="en-US" dirty="0"/>
               <a:t>Each Outlet has </a:t>
             </a:r>
             <a:r>
-              <a:rPr lang="en-US" dirty="0" err="1" smtClean="0"/>
+              <a:rPr lang="en-US" dirty="0" err="1"/>
               <a:t>OnOff</a:t>
             </a:r>
             <a:r>
-              <a:rPr lang="en-US" dirty="0" smtClean="0"/>
+              <a:rPr lang="en-US" dirty="0"/>
               <a:t>, Energy Monitor, Overcurrent and </a:t>
             </a:r>
             <a:r>
-              <a:rPr lang="en-US" dirty="0" err="1" smtClean="0"/>
+              <a:rPr lang="en-US" dirty="0" err="1"/>
               <a:t>Overtemperature</a:t>
             </a:r>
             <a:r>
-              <a:rPr lang="en-US" dirty="0" smtClean="0"/>
+              <a:rPr lang="en-US" dirty="0"/>
               <a:t> protection Capabilities</a:t>
             </a:r>
           </a:p>
           <a:p>
             <a:pPr lvl="1"/>
             <a:r>
-              <a:rPr lang="en-US" dirty="0" smtClean="0"/>
+              <a:rPr lang="en-US" dirty="0"/>
               <a:t>Multiple Outlets are composed into an outlet strip</a:t>
             </a:r>
           </a:p>
           <a:p>
             <a:pPr lvl="1"/>
             <a:r>
-              <a:rPr lang="en-US" dirty="0" smtClean="0"/>
+              <a:rPr lang="en-US" dirty="0"/>
               <a:t>Outlet unit can be a Thing</a:t>
             </a:r>
           </a:p>
           <a:p>
             <a:pPr lvl="1"/>
             <a:r>
-              <a:rPr lang="en-US" dirty="0" smtClean="0"/>
+              <a:rPr lang="en-US" dirty="0"/>
               <a:t>Outlet Strip can also be a Thing</a:t>
             </a:r>
-            <a:endParaRPr lang="en-US" dirty="0"/>
           </a:p>
         </p:txBody>
       </p:sp>
@@ -4567,29 +5392,28 @@
           <a:lstStyle/>
           <a:p>
             <a:r>
-              <a:rPr lang="en-US" dirty="0" err="1" smtClean="0"/>
+              <a:rPr lang="en-US" dirty="0" err="1"/>
               <a:t>schema.org</a:t>
             </a:r>
             <a:r>
-              <a:rPr lang="en-US" dirty="0" smtClean="0"/>
+              <a:rPr lang="en-US" dirty="0"/>
               <a:t> </a:t>
             </a:r>
             <a:r>
-              <a:rPr lang="en-US" dirty="0" err="1" smtClean="0"/>
+              <a:rPr lang="en-US" dirty="0" err="1"/>
               <a:t>IoT</a:t>
             </a:r>
             <a:r>
-              <a:rPr lang="en-US" dirty="0" smtClean="0"/>
+              <a:rPr lang="en-US" dirty="0"/>
               <a:t> Extension</a:t>
             </a:r>
             <a:br>
-              <a:rPr lang="en-US" dirty="0" smtClean="0"/>
+              <a:rPr lang="en-US" dirty="0"/>
             </a:br>
             <a:r>
-              <a:rPr lang="en-US" dirty="0" smtClean="0"/>
+              <a:rPr lang="en-US" dirty="0"/>
               <a:t>Meta Model with Thing Class</a:t>
             </a:r>
-            <a:endParaRPr lang="en-US" dirty="0"/>
           </a:p>
         </p:txBody>
       </p:sp>
@@ -4695,7 +5519,7 @@
           <a:p>
             <a:pPr algn="ctr"/>
             <a:r>
-              <a:rPr lang="en-US" sz="1600" dirty="0" err="1" smtClean="0">
+              <a:rPr lang="en-US" sz="1600" dirty="0" err="1">
                 <a:solidFill>
                   <a:schemeClr val="tx1"/>
                 </a:solidFill>
@@ -4817,7 +5641,7 @@
           <a:p>
             <a:pPr algn="ctr"/>
             <a:r>
-              <a:rPr lang="en-US" sz="1600" smtClean="0">
+              <a:rPr lang="en-US" sz="1600">
                 <a:solidFill>
                   <a:schemeClr val="tx1"/>
                 </a:solidFill>
@@ -4883,15 +5707,7 @@
                   <a:schemeClr val="tx1"/>
                 </a:solidFill>
               </a:rPr>
-              <a:t>I</a:t>
-            </a:r>
-            <a:r>
-              <a:rPr lang="en-US" sz="1600" dirty="0" err="1" smtClean="0">
-                <a:solidFill>
-                  <a:schemeClr val="tx1"/>
-                </a:solidFill>
-              </a:rPr>
-              <a:t>otEvent</a:t>
+              <a:t>IotEvent</a:t>
             </a:r>
             <a:endParaRPr lang="en-US" sz="1600" dirty="0">
               <a:solidFill>
@@ -4952,15 +5768,7 @@
                   <a:schemeClr val="tx1"/>
                 </a:solidFill>
               </a:rPr>
-              <a:t>I</a:t>
-            </a:r>
-            <a:r>
-              <a:rPr lang="en-US" sz="1600" dirty="0" err="1" smtClean="0">
-                <a:solidFill>
-                  <a:schemeClr val="tx1"/>
-                </a:solidFill>
-              </a:rPr>
-              <a:t>otProperty</a:t>
+              <a:t>IotProperty</a:t>
             </a:r>
             <a:endParaRPr lang="en-US" sz="1600" dirty="0">
               <a:solidFill>
@@ -5442,15 +6250,7 @@
                   <a:schemeClr val="tx1"/>
                 </a:solidFill>
               </a:rPr>
-              <a:t>I</a:t>
-            </a:r>
-            <a:r>
-              <a:rPr lang="en-US" sz="1600" dirty="0" err="1" smtClean="0">
-                <a:solidFill>
-                  <a:schemeClr val="tx1"/>
-                </a:solidFill>
-              </a:rPr>
-              <a:t>otDataItem</a:t>
+              <a:t>IotDataItem</a:t>
             </a:r>
             <a:endParaRPr lang="en-US" sz="1600" dirty="0">
               <a:solidFill>
@@ -5917,7 +6717,7 @@
           <a:p>
             <a:pPr algn="ctr"/>
             <a:r>
-              <a:rPr lang="en-US" sz="1600" dirty="0" err="1" smtClean="0">
+              <a:rPr lang="en-US" sz="1600" dirty="0" err="1">
                 <a:solidFill>
                   <a:schemeClr val="tx1"/>
                 </a:solidFill>
@@ -5955,22 +6755,22 @@
           <a:p>
             <a:pPr algn="r"/>
             <a:r>
-              <a:rPr lang="en-US" sz="1600" dirty="0" err="1" smtClean="0"/>
+              <a:rPr lang="en-US" sz="1600" dirty="0" err="1"/>
               <a:t>hasIotThing</a:t>
             </a:r>
-            <a:endParaRPr lang="en-US" sz="1600" dirty="0" smtClean="0"/>
+            <a:endParaRPr lang="en-US" sz="1600" dirty="0"/>
           </a:p>
           <a:p>
             <a:pPr algn="r"/>
             <a:r>
-              <a:rPr lang="en-US" sz="1600" dirty="0" err="1" smtClean="0">
+              <a:rPr lang="en-US" sz="1600" dirty="0" err="1">
                 <a:solidFill>
                   <a:schemeClr val="tx1"/>
                 </a:solidFill>
               </a:rPr>
               <a:t>hasIotCapability</a:t>
             </a:r>
-            <a:endParaRPr lang="en-US" sz="1600" dirty="0" smtClean="0">
+            <a:endParaRPr lang="en-US" sz="1600" dirty="0">
               <a:solidFill>
                 <a:schemeClr val="tx1"/>
               </a:solidFill>
@@ -6027,13 +6827,6 @@
   <p:clrMapOvr>
     <a:masterClrMapping/>
   </p:clrMapOvr>
-  <p:timing>
-    <p:tnLst>
-      <p:par>
-        <p:cTn id="1" dur="indefinite" restart="never" nodeType="tmRoot"/>
-      </p:par>
-    </p:tnLst>
-  </p:timing>
 </p:sld>
 </file>
 
@@ -6075,10 +6868,9 @@
           <a:lstStyle/>
           <a:p>
             <a:r>
-              <a:rPr lang="en-US" dirty="0" smtClean="0"/>
+              <a:rPr lang="en-US" dirty="0"/>
               <a:t>UML </a:t>
             </a:r>
-            <a:endParaRPr lang="en-US" dirty="0"/>
           </a:p>
         </p:txBody>
       </p:sp>
@@ -6216,115 +7008,95 @@
           <a:lstStyle/>
           <a:p>
             <a:r>
+              <a:rPr lang="en-US" dirty="0"/>
+              <a:t>iot.schema.org for Node-RED</a:t>
+            </a:r>
+            <a:br>
+              <a:rPr lang="en-US" dirty="0"/>
+            </a:br>
+            <a:r>
+              <a:rPr lang="en-US" sz="2100" dirty="0"/>
+              <a:t>Semantic Interoperability</a:t>
+            </a:r>
+          </a:p>
+        </p:txBody>
+      </p:sp>
+      <p:sp>
+        <p:nvSpPr>
+          <p:cNvPr id="3" name="Content Placeholder 2"/>
+          <p:cNvSpPr>
+            <a:spLocks noGrp="1"/>
+          </p:cNvSpPr>
+          <p:nvPr>
+            <p:ph idx="1"/>
+          </p:nvPr>
+        </p:nvSpPr>
+        <p:spPr/>
+        <p:txBody>
+          <a:bodyPr/>
+          <a:lstStyle/>
+          <a:p>
+            <a:r>
+              <a:rPr lang="en-US" dirty="0"/>
+              <a:t>iot.schema.org embedded in Node-RED tool</a:t>
+            </a:r>
+          </a:p>
+          <a:p>
+            <a:r>
+              <a:rPr lang="en-US" dirty="0"/>
+              <a:t>Easies use of semantics for </a:t>
+            </a:r>
+            <a:r>
               <a:rPr lang="en-US" dirty="0" err="1"/>
-              <a:t>Schema.org</a:t>
-            </a:r>
-            <a:r>
-              <a:rPr lang="en-US" dirty="0"/>
-              <a:t> Integration</a:t>
-            </a:r>
-          </a:p>
-        </p:txBody>
-      </p:sp>
-      <p:sp>
-        <p:nvSpPr>
-          <p:cNvPr id="3" name="Content Placeholder 2"/>
-          <p:cNvSpPr>
-            <a:spLocks noGrp="1"/>
-          </p:cNvSpPr>
-          <p:nvPr>
-            <p:ph idx="1"/>
-          </p:nvPr>
-        </p:nvSpPr>
-        <p:spPr/>
-        <p:txBody>
-          <a:bodyPr>
-            <a:normAutofit lnSpcReduction="10000"/>
-          </a:bodyPr>
-          <a:lstStyle/>
-          <a:p>
-            <a:r>
-              <a:rPr lang="en-US" dirty="0" smtClean="0"/>
-              <a:t>Class </a:t>
-            </a:r>
-            <a:r>
-              <a:rPr lang="en-US" dirty="0"/>
-              <a:t>names Event, Action, Property conflict</a:t>
-            </a:r>
-          </a:p>
-          <a:p>
+              <a:t>WoT</a:t>
+            </a:r>
+            <a:r>
+              <a:rPr lang="en-US" dirty="0"/>
+              <a:t> developers </a:t>
+            </a:r>
+          </a:p>
+          <a:p>
+            <a:r>
+              <a:rPr lang="en-US" dirty="0"/>
+              <a:t>Simplify creation of applications with W3C </a:t>
+            </a:r>
             <a:r>
               <a:rPr lang="en-US" dirty="0" err="1"/>
-              <a:t>iotschema</a:t>
-            </a:r>
-            <a:r>
-              <a:rPr lang="en-US" dirty="0"/>
-              <a:t> has diverse semantic types for objects, </a:t>
+              <a:t>WoT</a:t>
+            </a:r>
+            <a:endParaRPr lang="en-US" dirty="0"/>
+          </a:p>
+          <a:p>
+            <a:r>
+              <a:rPr lang="en-US" dirty="0"/>
+              <a:t>Demonstrates semantic discovery and processing </a:t>
+            </a:r>
+          </a:p>
+          <a:p>
+            <a:r>
+              <a:rPr lang="en-US" dirty="0"/>
+              <a:t>Handsome tool for </a:t>
             </a:r>
             <a:r>
               <a:rPr lang="en-US" dirty="0" err="1"/>
-              <a:t>schema.org</a:t>
-            </a:r>
-            <a:r>
-              <a:rPr lang="en-US" dirty="0"/>
-              <a:t> has diverse property types</a:t>
-            </a:r>
-          </a:p>
-          <a:p>
-            <a:r>
-              <a:rPr lang="en-US" dirty="0"/>
-              <a:t>Property types could be synthesized from objects but</a:t>
-            </a:r>
-            <a:r>
-              <a:rPr lang="mr-IN" dirty="0"/>
-              <a:t>…</a:t>
+              <a:t>WoT</a:t>
+            </a:r>
+            <a:r>
+              <a:rPr lang="en-US" dirty="0"/>
+              <a:t> </a:t>
+            </a:r>
+            <a:r>
+              <a:rPr lang="en-US" dirty="0" err="1"/>
+              <a:t>PlugFests</a:t>
             </a:r>
             <a:endParaRPr lang="en-US" dirty="0"/>
-          </a:p>
-          <a:p>
-            <a:r>
-              <a:rPr lang="en-US" dirty="0"/>
-              <a:t> </a:t>
-            </a:r>
-            <a:r>
-              <a:rPr lang="en-US" dirty="0" err="1"/>
-              <a:t>iotschema</a:t>
-            </a:r>
-            <a:r>
-              <a:rPr lang="en-US" dirty="0"/>
-              <a:t> will potentially define hundreds of types for physical quantities (temperature, humidity, voltage, acceleration</a:t>
-            </a:r>
-            <a:r>
-              <a:rPr lang="mr-IN" dirty="0"/>
-              <a:t>…</a:t>
-            </a:r>
-            <a:r>
-              <a:rPr lang="en-US" dirty="0"/>
-              <a:t>), control affordances (open/close, brightness, color control, camera controls, operating modes</a:t>
-            </a:r>
-            <a:r>
-              <a:rPr lang="mr-IN" dirty="0"/>
-              <a:t>…</a:t>
-            </a:r>
-            <a:r>
-              <a:rPr lang="en-US" dirty="0"/>
-              <a:t>), and features of interest (rooms, machines</a:t>
-            </a:r>
-            <a:r>
-              <a:rPr lang="mr-IN" dirty="0"/>
-              <a:t>…</a:t>
-            </a:r>
-            <a:r>
-              <a:rPr lang="en-US" dirty="0"/>
-              <a:t>)</a:t>
-            </a:r>
           </a:p>
         </p:txBody>
       </p:sp>
     </p:spTree>
     <p:extLst>
       <p:ext uri="{BB962C8B-B14F-4D97-AF65-F5344CB8AC3E}">
-        <p14:creationId xmlns:p14="http://schemas.microsoft.com/office/powerpoint/2010/main" val="1624716396"/>
+        <p14:creationId xmlns:p14="http://schemas.microsoft.com/office/powerpoint/2010/main" val="1493042186"/>
       </p:ext>
     </p:extLst>
   </p:cSld>

</xml_diff>

<commit_message>
Update the 2020-2-20 slides
sync with changes made during the meeting
</commit_message>
<xml_diff>
--- a/iotschema-20200220.pptx
+++ b/iotschema-20200220.pptx
@@ -3827,7 +3827,7 @@
           <p:cNvPr id="2" name="Title 1">
             <a:extLst>
               <a:ext uri="{FF2B5EF4-FFF2-40B4-BE49-F238E27FC236}">
-                <a16:creationId xmlns:a16="http://schemas.microsoft.com/office/drawing/2014/main" xmlns="" id="{9A489092-BC57-4C14-8534-8DBFC9C5E189}"/>
+                <a16:creationId xmlns:a16="http://schemas.microsoft.com/office/drawing/2014/main" id="{9A489092-BC57-4C14-8534-8DBFC9C5E189}"/>
               </a:ext>
             </a:extLst>
           </p:cNvPr>
@@ -3868,7 +3868,7 @@
           <p:cNvPr id="3" name="Content Placeholder 2">
             <a:extLst>
               <a:ext uri="{FF2B5EF4-FFF2-40B4-BE49-F238E27FC236}">
-                <a16:creationId xmlns:a16="http://schemas.microsoft.com/office/drawing/2014/main" xmlns="" id="{2B137D1E-7747-4046-9AD9-8E46C377A96A}"/>
+                <a16:creationId xmlns:a16="http://schemas.microsoft.com/office/drawing/2014/main" id="{2B137D1E-7747-4046-9AD9-8E46C377A96A}"/>
               </a:ext>
             </a:extLst>
           </p:cNvPr>
@@ -3979,7 +3979,7 @@
           <p:cNvPr id="2" name="Title 1">
             <a:extLst>
               <a:ext uri="{FF2B5EF4-FFF2-40B4-BE49-F238E27FC236}">
-                <a16:creationId xmlns:a16="http://schemas.microsoft.com/office/drawing/2014/main" xmlns="" id="{89B0A7AB-DA27-4CC3-88B2-5927CA4D023E}"/>
+                <a16:creationId xmlns:a16="http://schemas.microsoft.com/office/drawing/2014/main" id="{89B0A7AB-DA27-4CC3-88B2-5927CA4D023E}"/>
               </a:ext>
             </a:extLst>
           </p:cNvPr>
@@ -4023,7 +4023,7 @@
           <p:cNvPr id="3" name="Content Placeholder 2">
             <a:extLst>
               <a:ext uri="{FF2B5EF4-FFF2-40B4-BE49-F238E27FC236}">
-                <a16:creationId xmlns:a16="http://schemas.microsoft.com/office/drawing/2014/main" xmlns="" id="{08EA7300-79B9-4A21-864F-14E54C880B16}"/>
+                <a16:creationId xmlns:a16="http://schemas.microsoft.com/office/drawing/2014/main" id="{08EA7300-79B9-4A21-864F-14E54C880B16}"/>
               </a:ext>
             </a:extLst>
           </p:cNvPr>
@@ -4132,7 +4132,7 @@
           <p:cNvPr id="4" name="Picture 3">
             <a:extLst>
               <a:ext uri="{FF2B5EF4-FFF2-40B4-BE49-F238E27FC236}">
-                <a16:creationId xmlns:a16="http://schemas.microsoft.com/office/drawing/2014/main" xmlns="" id="{1188F709-458F-40E7-999B-93889D0E1B22}"/>
+                <a16:creationId xmlns:a16="http://schemas.microsoft.com/office/drawing/2014/main" id="{1188F709-458F-40E7-999B-93889D0E1B22}"/>
               </a:ext>
             </a:extLst>
           </p:cNvPr>
@@ -4167,7 +4167,7 @@
           <p:cNvPr id="5" name="Picture 4">
             <a:extLst>
               <a:ext uri="{FF2B5EF4-FFF2-40B4-BE49-F238E27FC236}">
-                <a16:creationId xmlns:a16="http://schemas.microsoft.com/office/drawing/2014/main" xmlns="" id="{D4B9BA00-AF52-41B6-98E7-6603AD97EFE1}"/>
+                <a16:creationId xmlns:a16="http://schemas.microsoft.com/office/drawing/2014/main" id="{D4B9BA00-AF52-41B6-98E7-6603AD97EFE1}"/>
               </a:ext>
             </a:extLst>
           </p:cNvPr>
@@ -4227,7 +4227,7 @@
           <p:cNvPr id="2" name="Title 1">
             <a:extLst>
               <a:ext uri="{FF2B5EF4-FFF2-40B4-BE49-F238E27FC236}">
-                <a16:creationId xmlns:a16="http://schemas.microsoft.com/office/drawing/2014/main" xmlns="" id="{16504304-DEE7-4705-AA3E-D70E51192DD3}"/>
+                <a16:creationId xmlns:a16="http://schemas.microsoft.com/office/drawing/2014/main" id="{16504304-DEE7-4705-AA3E-D70E51192DD3}"/>
               </a:ext>
             </a:extLst>
           </p:cNvPr>
@@ -4273,7 +4273,7 @@
           <p:cNvPr id="3" name="Content Placeholder 2">
             <a:extLst>
               <a:ext uri="{FF2B5EF4-FFF2-40B4-BE49-F238E27FC236}">
-                <a16:creationId xmlns:a16="http://schemas.microsoft.com/office/drawing/2014/main" xmlns="" id="{0A39DB3B-B34D-45FF-AD3E-687879574E4D}"/>
+                <a16:creationId xmlns:a16="http://schemas.microsoft.com/office/drawing/2014/main" id="{0A39DB3B-B34D-45FF-AD3E-687879574E4D}"/>
               </a:ext>
             </a:extLst>
           </p:cNvPr>
@@ -4371,10 +4371,6 @@
               <a:rPr lang="en-US" dirty="0" err="1"/>
               <a:t>nitrogenconcentration</a:t>
             </a:r>
-            <a:r>
-              <a:rPr lang="en-US" dirty="0"/>
-              <a:t/>
-            </a:r>
             <a:br>
               <a:rPr lang="en-US" dirty="0"/>
             </a:br>
@@ -4394,10 +4390,6 @@
               <a:rPr lang="en-US" dirty="0" err="1"/>
               <a:t>oxygenconcentration</a:t>
             </a:r>
-            <a:r>
-              <a:rPr lang="en-US" dirty="0"/>
-              <a:t/>
-            </a:r>
             <a:br>
               <a:rPr lang="en-US" dirty="0"/>
             </a:br>
@@ -4416,10 +4408,6 @@
             <a:r>
               <a:rPr lang="en-US" dirty="0" err="1"/>
               <a:t>carbondioxideconcentration</a:t>
-            </a:r>
-            <a:r>
-              <a:rPr lang="en-US" dirty="0"/>
-              <a:t/>
             </a:r>
             <a:br>
               <a:rPr lang="en-US" dirty="0"/>
@@ -4610,7 +4598,7 @@
           <p:cNvPr id="2" name="Title 1">
             <a:extLst>
               <a:ext uri="{FF2B5EF4-FFF2-40B4-BE49-F238E27FC236}">
-                <a16:creationId xmlns:a16="http://schemas.microsoft.com/office/drawing/2014/main" xmlns="" id="{9A489092-BC57-4C14-8534-8DBFC9C5E189}"/>
+                <a16:creationId xmlns:a16="http://schemas.microsoft.com/office/drawing/2014/main" id="{9A489092-BC57-4C14-8534-8DBFC9C5E189}"/>
               </a:ext>
             </a:extLst>
           </p:cNvPr>
@@ -4651,7 +4639,7 @@
           <p:cNvPr id="3" name="Content Placeholder 2">
             <a:extLst>
               <a:ext uri="{FF2B5EF4-FFF2-40B4-BE49-F238E27FC236}">
-                <a16:creationId xmlns:a16="http://schemas.microsoft.com/office/drawing/2014/main" xmlns="" id="{2B137D1E-7747-4046-9AD9-8E46C377A96A}"/>
+                <a16:creationId xmlns:a16="http://schemas.microsoft.com/office/drawing/2014/main" id="{2B137D1E-7747-4046-9AD9-8E46C377A96A}"/>
               </a:ext>
             </a:extLst>
           </p:cNvPr>
@@ -4762,7 +4750,7 @@
           <p:cNvPr id="2" name="Title 1">
             <a:extLst>
               <a:ext uri="{FF2B5EF4-FFF2-40B4-BE49-F238E27FC236}">
-                <a16:creationId xmlns:a16="http://schemas.microsoft.com/office/drawing/2014/main" xmlns="" id="{89B0A7AB-DA27-4CC3-88B2-5927CA4D023E}"/>
+                <a16:creationId xmlns:a16="http://schemas.microsoft.com/office/drawing/2014/main" id="{89B0A7AB-DA27-4CC3-88B2-5927CA4D023E}"/>
               </a:ext>
             </a:extLst>
           </p:cNvPr>
@@ -4806,7 +4794,7 @@
           <p:cNvPr id="3" name="Content Placeholder 2">
             <a:extLst>
               <a:ext uri="{FF2B5EF4-FFF2-40B4-BE49-F238E27FC236}">
-                <a16:creationId xmlns:a16="http://schemas.microsoft.com/office/drawing/2014/main" xmlns="" id="{08EA7300-79B9-4A21-864F-14E54C880B16}"/>
+                <a16:creationId xmlns:a16="http://schemas.microsoft.com/office/drawing/2014/main" id="{08EA7300-79B9-4A21-864F-14E54C880B16}"/>
               </a:ext>
             </a:extLst>
           </p:cNvPr>
@@ -4915,7 +4903,7 @@
           <p:cNvPr id="4" name="Picture 3">
             <a:extLst>
               <a:ext uri="{FF2B5EF4-FFF2-40B4-BE49-F238E27FC236}">
-                <a16:creationId xmlns:a16="http://schemas.microsoft.com/office/drawing/2014/main" xmlns="" id="{1188F709-458F-40E7-999B-93889D0E1B22}"/>
+                <a16:creationId xmlns:a16="http://schemas.microsoft.com/office/drawing/2014/main" id="{1188F709-458F-40E7-999B-93889D0E1B22}"/>
               </a:ext>
             </a:extLst>
           </p:cNvPr>
@@ -4950,7 +4938,7 @@
           <p:cNvPr id="5" name="Picture 4">
             <a:extLst>
               <a:ext uri="{FF2B5EF4-FFF2-40B4-BE49-F238E27FC236}">
-                <a16:creationId xmlns:a16="http://schemas.microsoft.com/office/drawing/2014/main" xmlns="" id="{D4B9BA00-AF52-41B6-98E7-6603AD97EFE1}"/>
+                <a16:creationId xmlns:a16="http://schemas.microsoft.com/office/drawing/2014/main" id="{D4B9BA00-AF52-41B6-98E7-6603AD97EFE1}"/>
               </a:ext>
             </a:extLst>
           </p:cNvPr>
@@ -5010,7 +4998,7 @@
           <p:cNvPr id="2" name="Title 1">
             <a:extLst>
               <a:ext uri="{FF2B5EF4-FFF2-40B4-BE49-F238E27FC236}">
-                <a16:creationId xmlns:a16="http://schemas.microsoft.com/office/drawing/2014/main" xmlns="" id="{16504304-DEE7-4705-AA3E-D70E51192DD3}"/>
+                <a16:creationId xmlns:a16="http://schemas.microsoft.com/office/drawing/2014/main" id="{16504304-DEE7-4705-AA3E-D70E51192DD3}"/>
               </a:ext>
             </a:extLst>
           </p:cNvPr>
@@ -5056,7 +5044,7 @@
           <p:cNvPr id="3" name="Content Placeholder 2">
             <a:extLst>
               <a:ext uri="{FF2B5EF4-FFF2-40B4-BE49-F238E27FC236}">
-                <a16:creationId xmlns:a16="http://schemas.microsoft.com/office/drawing/2014/main" xmlns="" id="{0A39DB3B-B34D-45FF-AD3E-687879574E4D}"/>
+                <a16:creationId xmlns:a16="http://schemas.microsoft.com/office/drawing/2014/main" id="{0A39DB3B-B34D-45FF-AD3E-687879574E4D}"/>
               </a:ext>
             </a:extLst>
           </p:cNvPr>
@@ -5154,10 +5142,6 @@
               <a:rPr lang="en-US" dirty="0" err="1"/>
               <a:t>nitrogenconcentration</a:t>
             </a:r>
-            <a:r>
-              <a:rPr lang="en-US" dirty="0"/>
-              <a:t/>
-            </a:r>
             <a:br>
               <a:rPr lang="en-US" dirty="0"/>
             </a:br>
@@ -5177,10 +5161,6 @@
               <a:rPr lang="en-US" dirty="0" err="1"/>
               <a:t>oxygenconcentration</a:t>
             </a:r>
-            <a:r>
-              <a:rPr lang="en-US" dirty="0"/>
-              <a:t/>
-            </a:r>
             <a:br>
               <a:rPr lang="en-US" dirty="0"/>
             </a:br>
@@ -5199,10 +5179,6 @@
             <a:r>
               <a:rPr lang="en-US" dirty="0" err="1"/>
               <a:t>carbondioxideconcentration</a:t>
-            </a:r>
-            <a:r>
-              <a:rPr lang="en-US" dirty="0"/>
-              <a:t/>
             </a:r>
             <a:br>
               <a:rPr lang="en-US" dirty="0"/>
@@ -8336,10 +8312,9 @@
           <a:lstStyle/>
           <a:p>
             <a:r>
-              <a:rPr lang="en-US" dirty="0" smtClean="0"/>
+              <a:rPr lang="en-US" dirty="0"/>
               <a:t>High Level </a:t>
             </a:r>
-            <a:endParaRPr lang="en-US" dirty="0"/>
           </a:p>
         </p:txBody>
       </p:sp>
@@ -8443,7 +8418,7 @@
         </p:nvSpPr>
         <p:spPr>
           <a:xfrm flipH="1">
-            <a:off x="5527531" y="2089007"/>
+            <a:off x="5496358" y="2089007"/>
             <a:ext cx="924791" cy="1122219"/>
           </a:xfrm>
           <a:prstGeom prst="snip1Rect">
@@ -8489,7 +8464,7 @@
         </p:nvSpPr>
         <p:spPr>
           <a:xfrm flipH="1">
-            <a:off x="5537922" y="4797137"/>
+            <a:off x="5496358" y="4797137"/>
             <a:ext cx="924791" cy="1122219"/>
           </a:xfrm>
           <a:prstGeom prst="snip1Rect">
@@ -8929,7 +8904,7 @@
         </p:nvSpPr>
         <p:spPr>
           <a:xfrm>
-            <a:off x="1779807" y="3528018"/>
+            <a:off x="1558034" y="3773395"/>
             <a:ext cx="922688" cy="369332"/>
           </a:xfrm>
           <a:prstGeom prst="rect">
@@ -8944,10 +8919,9 @@
           <a:lstStyle/>
           <a:p>
             <a:r>
-              <a:rPr lang="en-US" smtClean="0"/>
+              <a:rPr lang="en-US" dirty="0"/>
               <a:t>Convert</a:t>
             </a:r>
-            <a:endParaRPr lang="en-US" dirty="0"/>
           </a:p>
         </p:txBody>
       </p:sp>
@@ -8974,7 +8948,7 @@
           <a:lstStyle/>
           <a:p>
             <a:r>
-              <a:rPr lang="en-US" smtClean="0"/>
+              <a:rPr lang="en-US"/>
               <a:t>iotschema</a:t>
             </a:r>
             <a:endParaRPr lang="en-US" dirty="0"/>
@@ -9004,10 +8978,9 @@
           <a:lstStyle/>
           <a:p>
             <a:r>
-              <a:rPr lang="en-US" smtClean="0"/>
+              <a:rPr lang="en-US"/>
               <a:t>OMA LWM2M</a:t>
             </a:r>
-            <a:endParaRPr lang="en-US"/>
           </a:p>
         </p:txBody>
       </p:sp>
@@ -9034,10 +9007,9 @@
           <a:lstStyle/>
           <a:p>
             <a:r>
-              <a:rPr lang="en-US" dirty="0" smtClean="0"/>
+              <a:rPr lang="en-US" dirty="0"/>
               <a:t>OCF</a:t>
             </a:r>
-            <a:endParaRPr lang="en-US" dirty="0"/>
           </a:p>
         </p:txBody>
       </p:sp>
@@ -9064,10 +9036,9 @@
           <a:lstStyle/>
           <a:p>
             <a:r>
-              <a:rPr lang="en-US" smtClean="0"/>
+              <a:rPr lang="en-US"/>
               <a:t>Templates</a:t>
             </a:r>
-            <a:endParaRPr lang="en-US"/>
           </a:p>
         </p:txBody>
       </p:sp>
@@ -9094,14 +9065,13 @@
           <a:lstStyle/>
           <a:p>
             <a:r>
-              <a:rPr lang="en-US" dirty="0" err="1" smtClean="0"/>
+              <a:rPr lang="en-US" dirty="0" err="1"/>
               <a:t>WoT</a:t>
             </a:r>
             <a:r>
-              <a:rPr lang="en-US" dirty="0" smtClean="0"/>
+              <a:rPr lang="en-US" dirty="0"/>
               <a:t> TD</a:t>
             </a:r>
-            <a:endParaRPr lang="en-US" dirty="0"/>
           </a:p>
         </p:txBody>
       </p:sp>
@@ -9113,7 +9083,7 @@
         </p:nvSpPr>
         <p:spPr>
           <a:xfrm>
-            <a:off x="5684472" y="4401873"/>
+            <a:off x="5648866" y="4335381"/>
             <a:ext cx="736099" cy="369332"/>
           </a:xfrm>
           <a:prstGeom prst="rect">
@@ -9128,10 +9098,9 @@
           <a:lstStyle/>
           <a:p>
             <a:r>
-              <a:rPr lang="en-US" dirty="0" smtClean="0"/>
+              <a:rPr lang="en-US" dirty="0"/>
               <a:t>HTML</a:t>
             </a:r>
-            <a:endParaRPr lang="en-US" dirty="0"/>
           </a:p>
         </p:txBody>
       </p:sp>
@@ -9158,14 +9127,14 @@
           <a:lstStyle/>
           <a:p>
             <a:r>
-              <a:rPr lang="en-US" dirty="0" err="1" smtClean="0"/>
+              <a:rPr lang="en-US" dirty="0" err="1"/>
               <a:t>BRICKschema</a:t>
             </a:r>
-            <a:endParaRPr lang="en-US" dirty="0" smtClean="0"/>
-          </a:p>
-          <a:p>
-            <a:r>
-              <a:rPr lang="en-US" dirty="0" err="1" smtClean="0"/>
+            <a:endParaRPr lang="en-US" dirty="0"/>
+          </a:p>
+          <a:p>
+            <a:r>
+              <a:rPr lang="en-US" dirty="0" err="1"/>
               <a:t>VSSschema</a:t>
             </a:r>
             <a:endParaRPr lang="en-US" dirty="0"/>
@@ -9367,7 +9336,7 @@
         </p:nvCxnSpPr>
         <p:spPr>
           <a:xfrm>
-            <a:off x="4968648" y="4628287"/>
+            <a:off x="4927084" y="4628287"/>
             <a:ext cx="569274" cy="729960"/>
           </a:xfrm>
           <a:prstGeom prst="straightConnector1">
@@ -9490,10 +9459,9 @@
           <a:lstStyle/>
           <a:p>
             <a:r>
-              <a:rPr lang="en-US" dirty="0" smtClean="0"/>
+              <a:rPr lang="en-US" dirty="0"/>
               <a:t>SDF </a:t>
             </a:r>
-            <a:endParaRPr lang="en-US" dirty="0"/>
           </a:p>
         </p:txBody>
       </p:sp>
@@ -9505,7 +9473,7 @@
         </p:nvSpPr>
         <p:spPr>
           <a:xfrm>
-            <a:off x="3458724" y="2667229"/>
+            <a:off x="3647718" y="4834578"/>
             <a:ext cx="922688" cy="369332"/>
           </a:xfrm>
           <a:prstGeom prst="rect">
@@ -9520,7 +9488,7 @@
           <a:lstStyle/>
           <a:p>
             <a:r>
-              <a:rPr lang="en-US" smtClean="0"/>
+              <a:rPr lang="en-US"/>
               <a:t>Convert</a:t>
             </a:r>
             <a:endParaRPr lang="en-US" dirty="0"/>
@@ -9550,7 +9518,7 @@
           <a:lstStyle/>
           <a:p>
             <a:r>
-              <a:rPr lang="en-US" smtClean="0"/>
+              <a:rPr lang="en-US"/>
               <a:t>Annotate</a:t>
             </a:r>
             <a:endParaRPr lang="en-US" dirty="0"/>
@@ -9580,13 +9548,145 @@
           <a:lstStyle/>
           <a:p>
             <a:r>
-              <a:rPr lang="en-US" smtClean="0"/>
+              <a:rPr lang="en-US"/>
               <a:t>Annotate</a:t>
             </a:r>
             <a:endParaRPr lang="en-US" dirty="0"/>
           </a:p>
         </p:txBody>
       </p:sp>
+      <p:sp>
+        <p:nvSpPr>
+          <p:cNvPr id="36" name="Snip Single Corner Rectangle 35">
+            <a:extLst>
+              <a:ext uri="{FF2B5EF4-FFF2-40B4-BE49-F238E27FC236}">
+                <a16:creationId xmlns:a16="http://schemas.microsoft.com/office/drawing/2014/main" id="{53DB7200-A888-E94D-BC76-5D432CE1D362}"/>
+              </a:ext>
+            </a:extLst>
+          </p:cNvPr>
+          <p:cNvSpPr/>
+          <p:nvPr/>
+        </p:nvSpPr>
+        <p:spPr>
+          <a:xfrm flipH="1">
+            <a:off x="734290" y="4873339"/>
+            <a:ext cx="924791" cy="1122219"/>
+          </a:xfrm>
+          <a:prstGeom prst="snip1Rect">
+            <a:avLst/>
+          </a:prstGeom>
+          <a:noFill/>
+          <a:ln w="28575">
+            <a:solidFill>
+              <a:schemeClr val="tx1"/>
+            </a:solidFill>
+          </a:ln>
+        </p:spPr>
+        <p:style>
+          <a:lnRef idx="2">
+            <a:schemeClr val="accent1">
+              <a:shade val="50000"/>
+            </a:schemeClr>
+          </a:lnRef>
+          <a:fillRef idx="1">
+            <a:schemeClr val="accent1"/>
+          </a:fillRef>
+          <a:effectRef idx="0">
+            <a:schemeClr val="accent1"/>
+          </a:effectRef>
+          <a:fontRef idx="minor">
+            <a:schemeClr val="lt1"/>
+          </a:fontRef>
+        </p:style>
+        <p:txBody>
+          <a:bodyPr rtlCol="0" anchor="ctr"/>
+          <a:lstStyle/>
+          <a:p>
+            <a:pPr algn="ctr"/>
+            <a:endParaRPr lang="en-US"/>
+          </a:p>
+        </p:txBody>
+      </p:sp>
+      <p:sp>
+        <p:nvSpPr>
+          <p:cNvPr id="38" name="TextBox 37">
+            <a:extLst>
+              <a:ext uri="{FF2B5EF4-FFF2-40B4-BE49-F238E27FC236}">
+                <a16:creationId xmlns:a16="http://schemas.microsoft.com/office/drawing/2014/main" id="{8FF839AC-EB25-5744-9395-0C9DE6D98C44}"/>
+              </a:ext>
+            </a:extLst>
+          </p:cNvPr>
+          <p:cNvSpPr txBox="1"/>
+          <p:nvPr/>
+        </p:nvSpPr>
+        <p:spPr>
+          <a:xfrm>
+            <a:off x="358700" y="4545895"/>
+            <a:ext cx="1698991" cy="369332"/>
+          </a:xfrm>
+          <a:prstGeom prst="rect">
+            <a:avLst/>
+          </a:prstGeom>
+          <a:noFill/>
+        </p:spPr>
+        <p:txBody>
+          <a:bodyPr wrap="none" rtlCol="0">
+            <a:spAutoFit/>
+          </a:bodyPr>
+          <a:lstStyle/>
+          <a:p>
+            <a:r>
+              <a:rPr lang="en-US" dirty="0"/>
+              <a:t>ZA/CHIP DMWG</a:t>
+            </a:r>
+          </a:p>
+        </p:txBody>
+      </p:sp>
+      <p:cxnSp>
+        <p:nvCxnSpPr>
+          <p:cNvPr id="40" name="Straight Arrow Connector 39">
+            <a:extLst>
+              <a:ext uri="{FF2B5EF4-FFF2-40B4-BE49-F238E27FC236}">
+                <a16:creationId xmlns:a16="http://schemas.microsoft.com/office/drawing/2014/main" id="{42802C58-1A4A-9D4F-B2DF-15493F4409EB}"/>
+              </a:ext>
+            </a:extLst>
+          </p:cNvPr>
+          <p:cNvCxnSpPr>
+            <a:cxnSpLocks/>
+            <a:stCxn id="36" idx="2"/>
+          </p:cNvCxnSpPr>
+          <p:nvPr/>
+        </p:nvCxnSpPr>
+        <p:spPr>
+          <a:xfrm flipV="1">
+            <a:off x="1659081" y="3550228"/>
+            <a:ext cx="930257" cy="1884221"/>
+          </a:xfrm>
+          <a:prstGeom prst="straightConnector1">
+            <a:avLst/>
+          </a:prstGeom>
+          <a:ln w="28575">
+            <a:solidFill>
+              <a:schemeClr val="tx1"/>
+            </a:solidFill>
+            <a:tailEnd type="triangle"/>
+          </a:ln>
+        </p:spPr>
+        <p:style>
+          <a:lnRef idx="1">
+            <a:schemeClr val="accent1"/>
+          </a:lnRef>
+          <a:fillRef idx="0">
+            <a:schemeClr val="accent1"/>
+          </a:fillRef>
+          <a:effectRef idx="0">
+            <a:schemeClr val="accent1"/>
+          </a:effectRef>
+          <a:fontRef idx="minor">
+            <a:schemeClr val="tx1"/>
+          </a:fontRef>
+        </p:style>
+      </p:cxnSp>
     </p:spTree>
     <p:extLst>
       <p:ext uri="{BB962C8B-B14F-4D97-AF65-F5344CB8AC3E}">

</xml_diff>

<commit_message>
slides for April Teleconference
</commit_message>
<xml_diff>
--- a/iotschema-20200220.pptx
+++ b/iotschema-20200220.pptx
@@ -218,7 +218,7 @@
           <a:p>
             <a:fld id="{5FCBBBB3-5D7B-284E-801E-D00035F0C91A}" type="datetimeFigureOut">
               <a:rPr lang="en-US" smtClean="0"/>
-              <a:t>2/20/20</a:t>
+              <a:t>4/16/20</a:t>
             </a:fld>
             <a:endParaRPr lang="en-US"/>
           </a:p>
@@ -868,7 +868,7 @@
           <a:p>
             <a:fld id="{F774572E-0D61-7C4C-A97B-03BC6FC8585C}" type="datetimeFigureOut">
               <a:rPr lang="en-US" smtClean="0"/>
-              <a:t>2/20/20</a:t>
+              <a:t>4/16/20</a:t>
             </a:fld>
             <a:endParaRPr lang="en-US"/>
           </a:p>
@@ -1033,7 +1033,7 @@
           <a:p>
             <a:fld id="{F774572E-0D61-7C4C-A97B-03BC6FC8585C}" type="datetimeFigureOut">
               <a:rPr lang="en-US" smtClean="0"/>
-              <a:t>2/20/20</a:t>
+              <a:t>4/16/20</a:t>
             </a:fld>
             <a:endParaRPr lang="en-US"/>
           </a:p>
@@ -1208,7 +1208,7 @@
           <a:p>
             <a:fld id="{F774572E-0D61-7C4C-A97B-03BC6FC8585C}" type="datetimeFigureOut">
               <a:rPr lang="en-US" smtClean="0"/>
-              <a:t>2/20/20</a:t>
+              <a:t>4/16/20</a:t>
             </a:fld>
             <a:endParaRPr lang="en-US"/>
           </a:p>
@@ -1373,7 +1373,7 @@
           <a:p>
             <a:fld id="{F774572E-0D61-7C4C-A97B-03BC6FC8585C}" type="datetimeFigureOut">
               <a:rPr lang="en-US" smtClean="0"/>
-              <a:t>2/20/20</a:t>
+              <a:t>4/16/20</a:t>
             </a:fld>
             <a:endParaRPr lang="en-US"/>
           </a:p>
@@ -1612,7 +1612,7 @@
           <a:p>
             <a:fld id="{F774572E-0D61-7C4C-A97B-03BC6FC8585C}" type="datetimeFigureOut">
               <a:rPr lang="en-US" smtClean="0"/>
-              <a:t>2/20/20</a:t>
+              <a:t>4/16/20</a:t>
             </a:fld>
             <a:endParaRPr lang="en-US"/>
           </a:p>
@@ -1839,7 +1839,7 @@
           <a:p>
             <a:fld id="{F774572E-0D61-7C4C-A97B-03BC6FC8585C}" type="datetimeFigureOut">
               <a:rPr lang="en-US" smtClean="0"/>
-              <a:t>2/20/20</a:t>
+              <a:t>4/16/20</a:t>
             </a:fld>
             <a:endParaRPr lang="en-US"/>
           </a:p>
@@ -2201,7 +2201,7 @@
           <a:p>
             <a:fld id="{F774572E-0D61-7C4C-A97B-03BC6FC8585C}" type="datetimeFigureOut">
               <a:rPr lang="en-US" smtClean="0"/>
-              <a:t>2/20/20</a:t>
+              <a:t>4/16/20</a:t>
             </a:fld>
             <a:endParaRPr lang="en-US"/>
           </a:p>
@@ -2314,7 +2314,7 @@
           <a:p>
             <a:fld id="{F774572E-0D61-7C4C-A97B-03BC6FC8585C}" type="datetimeFigureOut">
               <a:rPr lang="en-US" smtClean="0"/>
-              <a:t>2/20/20</a:t>
+              <a:t>4/16/20</a:t>
             </a:fld>
             <a:endParaRPr lang="en-US"/>
           </a:p>
@@ -2404,7 +2404,7 @@
           <a:p>
             <a:fld id="{F774572E-0D61-7C4C-A97B-03BC6FC8585C}" type="datetimeFigureOut">
               <a:rPr lang="en-US" smtClean="0"/>
-              <a:t>2/20/20</a:t>
+              <a:t>4/16/20</a:t>
             </a:fld>
             <a:endParaRPr lang="en-US"/>
           </a:p>
@@ -2676,7 +2676,7 @@
           <a:p>
             <a:fld id="{F774572E-0D61-7C4C-A97B-03BC6FC8585C}" type="datetimeFigureOut">
               <a:rPr lang="en-US" smtClean="0"/>
-              <a:t>2/20/20</a:t>
+              <a:t>4/16/20</a:t>
             </a:fld>
             <a:endParaRPr lang="en-US"/>
           </a:p>
@@ -2928,7 +2928,7 @@
           <a:p>
             <a:fld id="{F774572E-0D61-7C4C-A97B-03BC6FC8585C}" type="datetimeFigureOut">
               <a:rPr lang="en-US" smtClean="0"/>
-              <a:t>2/20/20</a:t>
+              <a:t>4/16/20</a:t>
             </a:fld>
             <a:endParaRPr lang="en-US"/>
           </a:p>
@@ -3136,7 +3136,7 @@
           <a:p>
             <a:fld id="{F774572E-0D61-7C4C-A97B-03BC6FC8585C}" type="datetimeFigureOut">
               <a:rPr lang="en-US" smtClean="0"/>
-              <a:t>2/20/20</a:t>
+              <a:t>4/16/20</a:t>
             </a:fld>
             <a:endParaRPr lang="en-US"/>
           </a:p>

</xml_diff>